<commit_message>
Initial pass on updates for Codemash RDBS/NoSQL Drama talk.
</commit_message>
<xml_diff>
--- a/Architecture Without Data Drama.pptx
+++ b/Architecture Without Data Drama.pptx
@@ -11,13 +11,13 @@
     <p:sldId id="269" r:id="rId5"/>
     <p:sldId id="270" r:id="rId6"/>
     <p:sldId id="272" r:id="rId7"/>
-    <p:sldId id="278" r:id="rId8"/>
-    <p:sldId id="273" r:id="rId9"/>
-    <p:sldId id="271" r:id="rId10"/>
-    <p:sldId id="277" r:id="rId11"/>
-    <p:sldId id="274" r:id="rId12"/>
-    <p:sldId id="276" r:id="rId13"/>
-    <p:sldId id="275" r:id="rId14"/>
+    <p:sldId id="273" r:id="rId8"/>
+    <p:sldId id="271" r:id="rId9"/>
+    <p:sldId id="277" r:id="rId10"/>
+    <p:sldId id="274" r:id="rId11"/>
+    <p:sldId id="276" r:id="rId12"/>
+    <p:sldId id="275" r:id="rId13"/>
+    <p:sldId id="278" r:id="rId14"/>
     <p:sldId id="268" r:id="rId15"/>
   </p:sldIdLst>
   <p:sldSz cx="12192000" cy="6858000"/>
@@ -321,7 +321,7 @@
           <a:p>
             <a:fld id="{ECD19FB2-3AAB-4D03-B13A-2960828C78E3}" type="datetimeFigureOut">
               <a:rPr lang="en-US" dirty="0"/>
-              <a:t>4/4/17</a:t>
+              <a:t>1/4/18</a:t>
             </a:fld>
             <a:endParaRPr lang="en-US" dirty="0"/>
           </a:p>
@@ -602,7 +602,7 @@
           <a:p>
             <a:fld id="{1B80C674-7DFC-42FE-B9CD-82963CDB1557}" type="datetimeFigureOut">
               <a:rPr lang="en-US" dirty="0"/>
-              <a:t>4/4/17</a:t>
+              <a:t>1/4/18</a:t>
             </a:fld>
             <a:endParaRPr lang="en-US" dirty="0"/>
           </a:p>
@@ -793,7 +793,7 @@
           <a:p>
             <a:fld id="{2076456F-F47D-4F25-8053-2A695DA0CA7D}" type="datetimeFigureOut">
               <a:rPr lang="en-US" dirty="0"/>
-              <a:t>4/4/17</a:t>
+              <a:t>1/4/18</a:t>
             </a:fld>
             <a:endParaRPr lang="en-US" dirty="0"/>
           </a:p>
@@ -1053,7 +1053,7 @@
           <a:p>
             <a:fld id="{5D6C7379-69CC-4837-9905-BEBA22830C8A}" type="datetimeFigureOut">
               <a:rPr lang="en-US" dirty="0"/>
-              <a:t>4/4/17</a:t>
+              <a:t>1/4/18</a:t>
             </a:fld>
             <a:endParaRPr lang="en-US" dirty="0"/>
           </a:p>
@@ -1478,7 +1478,7 @@
           <a:p>
             <a:fld id="{49EB8B7E-8AEE-4F10-BFEE-C999AD004D36}" type="datetimeFigureOut">
               <a:rPr lang="en-US" dirty="0"/>
-              <a:t>4/4/17</a:t>
+              <a:t>1/4/18</a:t>
             </a:fld>
             <a:endParaRPr lang="en-US" dirty="0"/>
           </a:p>
@@ -2023,7 +2023,7 @@
           <a:p>
             <a:fld id="{8668F3F9-58BC-440B-B37B-805B9055EF92}" type="datetimeFigureOut">
               <a:rPr lang="en-US" dirty="0"/>
-              <a:t>4/4/17</a:t>
+              <a:t>1/4/18</a:t>
             </a:fld>
             <a:endParaRPr lang="en-US" dirty="0"/>
           </a:p>
@@ -2853,7 +2853,7 @@
           <a:p>
             <a:fld id="{0D5A53AF-48EA-489D-8260-9DCAB666386A}" type="datetimeFigureOut">
               <a:rPr lang="en-US" dirty="0"/>
-              <a:t>4/4/17</a:t>
+              <a:t>1/4/18</a:t>
             </a:fld>
             <a:endParaRPr lang="en-US" dirty="0"/>
           </a:p>
@@ -3022,7 +3022,7 @@
           <a:p>
             <a:fld id="{0DED02AE-B9A4-47BD-AF8E-97E16144138B}" type="datetimeFigureOut">
               <a:rPr lang="en-US" dirty="0"/>
-              <a:t>4/4/17</a:t>
+              <a:t>1/4/18</a:t>
             </a:fld>
             <a:endParaRPr lang="en-US" dirty="0"/>
           </a:p>
@@ -3201,7 +3201,7 @@
           <a:p>
             <a:fld id="{CF0FD78B-DB02-4362-BCDC-98A55456977C}" type="datetimeFigureOut">
               <a:rPr lang="en-US" dirty="0"/>
-              <a:t>4/4/17</a:t>
+              <a:t>1/4/18</a:t>
             </a:fld>
             <a:endParaRPr lang="en-US" dirty="0"/>
           </a:p>
@@ -3370,7 +3370,7 @@
           <a:p>
             <a:fld id="{99916976-5D93-46E4-A98A-FAD63E4D0EA8}" type="datetimeFigureOut">
               <a:rPr lang="en-US" dirty="0"/>
-              <a:t>4/4/17</a:t>
+              <a:t>1/4/18</a:t>
             </a:fld>
             <a:endParaRPr lang="en-US" dirty="0"/>
           </a:p>
@@ -3626,7 +3626,7 @@
           <a:p>
             <a:fld id="{0F39F4F5-F4D2-4D2A-AB60-88D37ADCB869}" type="datetimeFigureOut">
               <a:rPr lang="en-US" dirty="0"/>
-              <a:t>4/4/17</a:t>
+              <a:t>1/4/18</a:t>
             </a:fld>
             <a:endParaRPr lang="en-US" dirty="0"/>
           </a:p>
@@ -3857,7 +3857,7 @@
           <a:p>
             <a:fld id="{D23BC6CE-6D1E-47E5-8859-F31AC5380EB2}" type="datetimeFigureOut">
               <a:rPr lang="en-US" dirty="0"/>
-              <a:t>4/4/17</a:t>
+              <a:t>1/4/18</a:t>
             </a:fld>
             <a:endParaRPr lang="en-US" dirty="0"/>
           </a:p>
@@ -4249,7 +4249,7 @@
           <a:p>
             <a:fld id="{B1B4E7C4-4DA4-404D-9965-B13F2DD7D8BF}" type="datetimeFigureOut">
               <a:rPr lang="en-US" dirty="0"/>
-              <a:t>4/4/17</a:t>
+              <a:t>1/4/18</a:t>
             </a:fld>
             <a:endParaRPr lang="en-US" dirty="0"/>
           </a:p>
@@ -4366,7 +4366,7 @@
           <a:p>
             <a:fld id="{476FB7AA-4A53-424F-AD41-70827B6504BA}" type="datetimeFigureOut">
               <a:rPr lang="en-US" dirty="0"/>
-              <a:t>4/4/17</a:t>
+              <a:t>1/4/18</a:t>
             </a:fld>
             <a:endParaRPr lang="en-US" dirty="0"/>
           </a:p>
@@ -4460,7 +4460,7 @@
           <a:p>
             <a:fld id="{E7884882-FB12-4BC8-9960-9AD8104D7FAE}" type="datetimeFigureOut">
               <a:rPr lang="en-US" dirty="0"/>
-              <a:t>4/4/17</a:t>
+              <a:t>1/4/18</a:t>
             </a:fld>
             <a:endParaRPr lang="en-US" dirty="0"/>
           </a:p>
@@ -4732,7 +4732,7 @@
           <a:p>
             <a:fld id="{F7D1BD23-6E54-4D9D-AD88-A2813C73CC25}" type="datetimeFigureOut">
               <a:rPr lang="en-US" dirty="0"/>
-              <a:t>4/4/17</a:t>
+              <a:t>1/4/18</a:t>
             </a:fld>
             <a:endParaRPr lang="en-US" dirty="0"/>
           </a:p>
@@ -5012,7 +5012,7 @@
           <a:p>
             <a:fld id="{1471A834-4F3C-4AF9-9C74-05EC35A0F292}" type="datetimeFigureOut">
               <a:rPr lang="en-US" dirty="0"/>
-              <a:t>4/4/17</a:t>
+              <a:t>1/4/18</a:t>
             </a:fld>
             <a:endParaRPr lang="en-US" dirty="0"/>
           </a:p>
@@ -5251,7 +5251,7 @@
           <a:p>
             <a:fld id="{51CF1133-3259-4C45-BABA-5B62D9C6F78D}" type="datetimeFigureOut">
               <a:rPr lang="en-US" dirty="0"/>
-              <a:t>4/4/17</a:t>
+              <a:t>1/4/18</a:t>
             </a:fld>
             <a:endParaRPr lang="en-US" dirty="0"/>
           </a:p>
@@ -5961,7 +5961,7 @@
           <a:p>
             <a:r>
               <a:rPr lang="en-US" dirty="0" smtClean="0"/>
-              <a:t>“Normal” thinking</a:t>
+              <a:t>SQL sauce: Avoid the join</a:t>
             </a:r>
             <a:endParaRPr lang="en-US" dirty="0"/>
           </a:p>
@@ -5984,130 +5984,6 @@
           <a:p>
             <a:r>
               <a:rPr lang="en-US" dirty="0" smtClean="0"/>
-              <a:t>BAD:</a:t>
-            </a:r>
-          </a:p>
-          <a:p>
-            <a:pPr lvl="1"/>
-            <a:r>
-              <a:rPr lang="en-US" dirty="0" smtClean="0"/>
-              <a:t>Parent table with object definition and metadata</a:t>
-            </a:r>
-          </a:p>
-          <a:p>
-            <a:pPr lvl="1"/>
-            <a:r>
-              <a:rPr lang="en-US" dirty="0" smtClean="0"/>
-              <a:t>Child tables: Key value pairs</a:t>
-            </a:r>
-          </a:p>
-          <a:p>
-            <a:pPr lvl="1"/>
-            <a:r>
-              <a:rPr lang="en-US" dirty="0" smtClean="0"/>
-              <a:t>More tables: Actual data referencing the child tables</a:t>
-            </a:r>
-          </a:p>
-          <a:p>
-            <a:pPr lvl="1"/>
-            <a:endParaRPr lang="en-US" dirty="0"/>
-          </a:p>
-          <a:p>
-            <a:r>
-              <a:rPr lang="en-US" dirty="0" smtClean="0"/>
-              <a:t>GOOD:</a:t>
-            </a:r>
-          </a:p>
-          <a:p>
-            <a:pPr lvl="1"/>
-            <a:r>
-              <a:rPr lang="en-US" dirty="0" smtClean="0"/>
-              <a:t>One table, rows for definition, metadata and serialized data blob</a:t>
-            </a:r>
-          </a:p>
-          <a:p>
-            <a:pPr lvl="1"/>
-            <a:endParaRPr lang="en-US" dirty="0"/>
-          </a:p>
-        </p:txBody>
-      </p:sp>
-    </p:spTree>
-    <p:extLst>
-      <p:ext uri="{BB962C8B-B14F-4D97-AF65-F5344CB8AC3E}">
-        <p14:creationId xmlns:p14="http://schemas.microsoft.com/office/powerpoint/2010/main" val="169488949"/>
-      </p:ext>
-    </p:extLst>
-  </p:cSld>
-  <p:clrMapOvr>
-    <a:masterClrMapping/>
-  </p:clrMapOvr>
-  <p:timing>
-    <p:tnLst>
-      <p:par>
-        <p:cTn id="1" dur="indefinite" restart="never" nodeType="tmRoot"/>
-      </p:par>
-    </p:tnLst>
-  </p:timing>
-</p:sld>
-</file>
-
-<file path=ppt/slides/slide11.xml><?xml version="1.0" encoding="utf-8"?>
-<p:sld xmlns:a="http://schemas.openxmlformats.org/drawingml/2006/main" xmlns:r="http://schemas.openxmlformats.org/officeDocument/2006/relationships" xmlns:p="http://schemas.openxmlformats.org/presentationml/2006/main">
-  <p:cSld>
-    <p:spTree>
-      <p:nvGrpSpPr>
-        <p:cNvPr id="1" name=""/>
-        <p:cNvGrpSpPr/>
-        <p:nvPr/>
-      </p:nvGrpSpPr>
-      <p:grpSpPr>
-        <a:xfrm>
-          <a:off x="0" y="0"/>
-          <a:ext cx="0" cy="0"/>
-          <a:chOff x="0" y="0"/>
-          <a:chExt cx="0" cy="0"/>
-        </a:xfrm>
-      </p:grpSpPr>
-      <p:sp>
-        <p:nvSpPr>
-          <p:cNvPr id="2" name="Title 1"/>
-          <p:cNvSpPr>
-            <a:spLocks noGrp="1"/>
-          </p:cNvSpPr>
-          <p:nvPr>
-            <p:ph type="title"/>
-          </p:nvPr>
-        </p:nvSpPr>
-        <p:spPr/>
-        <p:txBody>
-          <a:bodyPr/>
-          <a:lstStyle/>
-          <a:p>
-            <a:r>
-              <a:rPr lang="en-US" dirty="0" smtClean="0"/>
-              <a:t>SQL sauce: Avoid the join</a:t>
-            </a:r>
-            <a:endParaRPr lang="en-US" dirty="0"/>
-          </a:p>
-        </p:txBody>
-      </p:sp>
-      <p:sp>
-        <p:nvSpPr>
-          <p:cNvPr id="3" name="Content Placeholder 2"/>
-          <p:cNvSpPr>
-            <a:spLocks noGrp="1"/>
-          </p:cNvSpPr>
-          <p:nvPr>
-            <p:ph idx="1"/>
-          </p:nvPr>
-        </p:nvSpPr>
-        <p:spPr/>
-        <p:txBody>
-          <a:bodyPr/>
-          <a:lstStyle/>
-          <a:p>
-            <a:r>
-              <a:rPr lang="en-US" dirty="0" smtClean="0"/>
               <a:t>Aggregate querying is the performance bottleneck sin for the average LOB app. Multiple joins plus averages or sums are bad news.</a:t>
             </a:r>
           </a:p>
@@ -6126,7 +6002,15 @@
           <a:p>
             <a:r>
               <a:rPr lang="en-US" dirty="0" smtClean="0"/>
-              <a:t>One calculation when the data changes in faster than calculating all of it every time! </a:t>
+              <a:t>One calculation when the data changes </a:t>
+            </a:r>
+            <a:r>
+              <a:rPr lang="en-US" dirty="0" smtClean="0"/>
+              <a:t>is </a:t>
+            </a:r>
+            <a:r>
+              <a:rPr lang="en-US" dirty="0" smtClean="0"/>
+              <a:t>faster than calculating all of it every time! </a:t>
             </a:r>
             <a:endParaRPr lang="en-US" dirty="0"/>
           </a:p>
@@ -6422,7 +6306,7 @@
 </p:sld>
 </file>
 
-<file path=ppt/slides/slide12.xml><?xml version="1.0" encoding="utf-8"?>
+<file path=ppt/slides/slide11.xml><?xml version="1.0" encoding="utf-8"?>
 <p:sld xmlns:a="http://schemas.openxmlformats.org/drawingml/2006/main" xmlns:r="http://schemas.openxmlformats.org/officeDocument/2006/relationships" xmlns:p="http://schemas.openxmlformats.org/presentationml/2006/main">
   <p:cSld>
     <p:spTree>
@@ -6677,7 +6561,7 @@
 </p:sld>
 </file>
 
-<file path=ppt/slides/slide13.xml><?xml version="1.0" encoding="utf-8"?>
+<file path=ppt/slides/slide12.xml><?xml version="1.0" encoding="utf-8"?>
 <p:sld xmlns:a="http://schemas.openxmlformats.org/drawingml/2006/main" xmlns:r="http://schemas.openxmlformats.org/officeDocument/2006/relationships" xmlns:p="http://schemas.openxmlformats.org/presentationml/2006/main">
   <p:cSld>
     <p:spTree>
@@ -6729,7 +6613,9 @@
         </p:nvSpPr>
         <p:spPr/>
         <p:txBody>
-          <a:bodyPr/>
+          <a:bodyPr>
+            <a:normAutofit lnSpcReduction="10000"/>
+          </a:bodyPr>
           <a:lstStyle/>
           <a:p>
             <a:r>
@@ -6766,7 +6652,17 @@
           <a:p>
             <a:r>
               <a:rPr lang="en-US" dirty="0" smtClean="0"/>
-              <a:t>Pricing models vary based on a combination of storage and transactional throughput.</a:t>
+              <a:t>Pricing models vary based on a combination of storage and transactional throughput</a:t>
+            </a:r>
+            <a:r>
+              <a:rPr lang="en-US" dirty="0" smtClean="0"/>
+              <a:t>.</a:t>
+            </a:r>
+          </a:p>
+          <a:p>
+            <a:r>
+              <a:rPr lang="en-US" dirty="0" smtClean="0"/>
+              <a:t>Experimentation and prototyping is super cheap, so you can make informed choices.</a:t>
             </a:r>
             <a:endParaRPr lang="en-US" dirty="0"/>
           </a:p>
@@ -6776,1561 +6672,6 @@
     <p:extLst>
       <p:ext uri="{BB962C8B-B14F-4D97-AF65-F5344CB8AC3E}">
         <p14:creationId xmlns:p14="http://schemas.microsoft.com/office/powerpoint/2010/main" val="990418597"/>
-      </p:ext>
-    </p:extLst>
-  </p:cSld>
-  <p:clrMapOvr>
-    <a:masterClrMapping/>
-  </p:clrMapOvr>
-  <p:timing>
-    <p:tnLst>
-      <p:par>
-        <p:cTn id="1" dur="indefinite" restart="never" nodeType="tmRoot">
-          <p:childTnLst>
-            <p:seq concurrent="1" nextAc="seek">
-              <p:cTn id="2" dur="indefinite" nodeType="mainSeq">
-                <p:childTnLst>
-                  <p:par>
-                    <p:cTn id="3" fill="hold">
-                      <p:stCondLst>
-                        <p:cond delay="indefinite"/>
-                      </p:stCondLst>
-                      <p:childTnLst>
-                        <p:par>
-                          <p:cTn id="4" fill="hold">
-                            <p:stCondLst>
-                              <p:cond delay="0"/>
-                            </p:stCondLst>
-                            <p:childTnLst>
-                              <p:par>
-                                <p:cTn id="5" presetID="10" presetClass="entr" presetSubtype="0" fill="hold" grpId="0" nodeType="clickEffect">
-                                  <p:stCondLst>
-                                    <p:cond delay="0"/>
-                                  </p:stCondLst>
-                                  <p:childTnLst>
-                                    <p:set>
-                                      <p:cBhvr>
-                                        <p:cTn id="6" dur="1" fill="hold">
-                                          <p:stCondLst>
-                                            <p:cond delay="0"/>
-                                          </p:stCondLst>
-                                        </p:cTn>
-                                        <p:tgtEl>
-                                          <p:spTgt spid="3">
-                                            <p:txEl>
-                                              <p:pRg st="0" end="0"/>
-                                            </p:txEl>
-                                          </p:spTgt>
-                                        </p:tgtEl>
-                                        <p:attrNameLst>
-                                          <p:attrName>style.visibility</p:attrName>
-                                        </p:attrNameLst>
-                                      </p:cBhvr>
-                                      <p:to>
-                                        <p:strVal val="visible"/>
-                                      </p:to>
-                                    </p:set>
-                                    <p:animEffect transition="in" filter="fade">
-                                      <p:cBhvr>
-                                        <p:cTn id="7" dur="500"/>
-                                        <p:tgtEl>
-                                          <p:spTgt spid="3">
-                                            <p:txEl>
-                                              <p:pRg st="0" end="0"/>
-                                            </p:txEl>
-                                          </p:spTgt>
-                                        </p:tgtEl>
-                                      </p:cBhvr>
-                                    </p:animEffect>
-                                  </p:childTnLst>
-                                </p:cTn>
-                              </p:par>
-                            </p:childTnLst>
-                          </p:cTn>
-                        </p:par>
-                      </p:childTnLst>
-                    </p:cTn>
-                  </p:par>
-                  <p:par>
-                    <p:cTn id="8" fill="hold">
-                      <p:stCondLst>
-                        <p:cond delay="indefinite"/>
-                      </p:stCondLst>
-                      <p:childTnLst>
-                        <p:par>
-                          <p:cTn id="9" fill="hold">
-                            <p:stCondLst>
-                              <p:cond delay="0"/>
-                            </p:stCondLst>
-                            <p:childTnLst>
-                              <p:par>
-                                <p:cTn id="10" presetID="10" presetClass="entr" presetSubtype="0" fill="hold" grpId="0" nodeType="clickEffect">
-                                  <p:stCondLst>
-                                    <p:cond delay="0"/>
-                                  </p:stCondLst>
-                                  <p:childTnLst>
-                                    <p:set>
-                                      <p:cBhvr>
-                                        <p:cTn id="11" dur="1" fill="hold">
-                                          <p:stCondLst>
-                                            <p:cond delay="0"/>
-                                          </p:stCondLst>
-                                        </p:cTn>
-                                        <p:tgtEl>
-                                          <p:spTgt spid="3">
-                                            <p:txEl>
-                                              <p:pRg st="1" end="1"/>
-                                            </p:txEl>
-                                          </p:spTgt>
-                                        </p:tgtEl>
-                                        <p:attrNameLst>
-                                          <p:attrName>style.visibility</p:attrName>
-                                        </p:attrNameLst>
-                                      </p:cBhvr>
-                                      <p:to>
-                                        <p:strVal val="visible"/>
-                                      </p:to>
-                                    </p:set>
-                                    <p:animEffect transition="in" filter="fade">
-                                      <p:cBhvr>
-                                        <p:cTn id="12" dur="500"/>
-                                        <p:tgtEl>
-                                          <p:spTgt spid="3">
-                                            <p:txEl>
-                                              <p:pRg st="1" end="1"/>
-                                            </p:txEl>
-                                          </p:spTgt>
-                                        </p:tgtEl>
-                                      </p:cBhvr>
-                                    </p:animEffect>
-                                  </p:childTnLst>
-                                </p:cTn>
-                              </p:par>
-                            </p:childTnLst>
-                          </p:cTn>
-                        </p:par>
-                      </p:childTnLst>
-                    </p:cTn>
-                  </p:par>
-                  <p:par>
-                    <p:cTn id="13" fill="hold">
-                      <p:stCondLst>
-                        <p:cond delay="indefinite"/>
-                      </p:stCondLst>
-                      <p:childTnLst>
-                        <p:par>
-                          <p:cTn id="14" fill="hold">
-                            <p:stCondLst>
-                              <p:cond delay="0"/>
-                            </p:stCondLst>
-                            <p:childTnLst>
-                              <p:par>
-                                <p:cTn id="15" presetID="10" presetClass="entr" presetSubtype="0" fill="hold" grpId="0" nodeType="clickEffect">
-                                  <p:stCondLst>
-                                    <p:cond delay="0"/>
-                                  </p:stCondLst>
-                                  <p:childTnLst>
-                                    <p:set>
-                                      <p:cBhvr>
-                                        <p:cTn id="16" dur="1" fill="hold">
-                                          <p:stCondLst>
-                                            <p:cond delay="0"/>
-                                          </p:stCondLst>
-                                        </p:cTn>
-                                        <p:tgtEl>
-                                          <p:spTgt spid="3">
-                                            <p:txEl>
-                                              <p:pRg st="2" end="2"/>
-                                            </p:txEl>
-                                          </p:spTgt>
-                                        </p:tgtEl>
-                                        <p:attrNameLst>
-                                          <p:attrName>style.visibility</p:attrName>
-                                        </p:attrNameLst>
-                                      </p:cBhvr>
-                                      <p:to>
-                                        <p:strVal val="visible"/>
-                                      </p:to>
-                                    </p:set>
-                                    <p:animEffect transition="in" filter="fade">
-                                      <p:cBhvr>
-                                        <p:cTn id="17" dur="500"/>
-                                        <p:tgtEl>
-                                          <p:spTgt spid="3">
-                                            <p:txEl>
-                                              <p:pRg st="2" end="2"/>
-                                            </p:txEl>
-                                          </p:spTgt>
-                                        </p:tgtEl>
-                                      </p:cBhvr>
-                                    </p:animEffect>
-                                  </p:childTnLst>
-                                </p:cTn>
-                              </p:par>
-                            </p:childTnLst>
-                          </p:cTn>
-                        </p:par>
-                      </p:childTnLst>
-                    </p:cTn>
-                  </p:par>
-                  <p:par>
-                    <p:cTn id="18" fill="hold">
-                      <p:stCondLst>
-                        <p:cond delay="indefinite"/>
-                      </p:stCondLst>
-                      <p:childTnLst>
-                        <p:par>
-                          <p:cTn id="19" fill="hold">
-                            <p:stCondLst>
-                              <p:cond delay="0"/>
-                            </p:stCondLst>
-                            <p:childTnLst>
-                              <p:par>
-                                <p:cTn id="20" presetID="10" presetClass="entr" presetSubtype="0" fill="hold" grpId="0" nodeType="clickEffect">
-                                  <p:stCondLst>
-                                    <p:cond delay="0"/>
-                                  </p:stCondLst>
-                                  <p:childTnLst>
-                                    <p:set>
-                                      <p:cBhvr>
-                                        <p:cTn id="21" dur="1" fill="hold">
-                                          <p:stCondLst>
-                                            <p:cond delay="0"/>
-                                          </p:stCondLst>
-                                        </p:cTn>
-                                        <p:tgtEl>
-                                          <p:spTgt spid="3">
-                                            <p:txEl>
-                                              <p:pRg st="3" end="3"/>
-                                            </p:txEl>
-                                          </p:spTgt>
-                                        </p:tgtEl>
-                                        <p:attrNameLst>
-                                          <p:attrName>style.visibility</p:attrName>
-                                        </p:attrNameLst>
-                                      </p:cBhvr>
-                                      <p:to>
-                                        <p:strVal val="visible"/>
-                                      </p:to>
-                                    </p:set>
-                                    <p:animEffect transition="in" filter="fade">
-                                      <p:cBhvr>
-                                        <p:cTn id="22" dur="500"/>
-                                        <p:tgtEl>
-                                          <p:spTgt spid="3">
-                                            <p:txEl>
-                                              <p:pRg st="3" end="3"/>
-                                            </p:txEl>
-                                          </p:spTgt>
-                                        </p:tgtEl>
-                                      </p:cBhvr>
-                                    </p:animEffect>
-                                  </p:childTnLst>
-                                </p:cTn>
-                              </p:par>
-                            </p:childTnLst>
-                          </p:cTn>
-                        </p:par>
-                      </p:childTnLst>
-                    </p:cTn>
-                  </p:par>
-                  <p:par>
-                    <p:cTn id="23" fill="hold">
-                      <p:stCondLst>
-                        <p:cond delay="indefinite"/>
-                      </p:stCondLst>
-                      <p:childTnLst>
-                        <p:par>
-                          <p:cTn id="24" fill="hold">
-                            <p:stCondLst>
-                              <p:cond delay="0"/>
-                            </p:stCondLst>
-                            <p:childTnLst>
-                              <p:par>
-                                <p:cTn id="25" presetID="10" presetClass="entr" presetSubtype="0" fill="hold" grpId="0" nodeType="clickEffect">
-                                  <p:stCondLst>
-                                    <p:cond delay="0"/>
-                                  </p:stCondLst>
-                                  <p:childTnLst>
-                                    <p:set>
-                                      <p:cBhvr>
-                                        <p:cTn id="26" dur="1" fill="hold">
-                                          <p:stCondLst>
-                                            <p:cond delay="0"/>
-                                          </p:stCondLst>
-                                        </p:cTn>
-                                        <p:tgtEl>
-                                          <p:spTgt spid="3">
-                                            <p:txEl>
-                                              <p:pRg st="4" end="4"/>
-                                            </p:txEl>
-                                          </p:spTgt>
-                                        </p:tgtEl>
-                                        <p:attrNameLst>
-                                          <p:attrName>style.visibility</p:attrName>
-                                        </p:attrNameLst>
-                                      </p:cBhvr>
-                                      <p:to>
-                                        <p:strVal val="visible"/>
-                                      </p:to>
-                                    </p:set>
-                                    <p:animEffect transition="in" filter="fade">
-                                      <p:cBhvr>
-                                        <p:cTn id="27" dur="500"/>
-                                        <p:tgtEl>
-                                          <p:spTgt spid="3">
-                                            <p:txEl>
-                                              <p:pRg st="4" end="4"/>
-                                            </p:txEl>
-                                          </p:spTgt>
-                                        </p:tgtEl>
-                                      </p:cBhvr>
-                                    </p:animEffect>
-                                  </p:childTnLst>
-                                </p:cTn>
-                              </p:par>
-                            </p:childTnLst>
-                          </p:cTn>
-                        </p:par>
-                      </p:childTnLst>
-                    </p:cTn>
-                  </p:par>
-                </p:childTnLst>
-              </p:cTn>
-              <p:prevCondLst>
-                <p:cond evt="onPrev" delay="0">
-                  <p:tgtEl>
-                    <p:sldTgt/>
-                  </p:tgtEl>
-                </p:cond>
-              </p:prevCondLst>
-              <p:nextCondLst>
-                <p:cond evt="onNext" delay="0">
-                  <p:tgtEl>
-                    <p:sldTgt/>
-                  </p:tgtEl>
-                </p:cond>
-              </p:nextCondLst>
-            </p:seq>
-          </p:childTnLst>
-        </p:cTn>
-      </p:par>
-    </p:tnLst>
-    <p:bldLst>
-      <p:bldP spid="3" grpId="0" build="p"/>
-    </p:bldLst>
-  </p:timing>
-</p:sld>
-</file>
-
-<file path=ppt/slides/slide14.xml><?xml version="1.0" encoding="utf-8"?>
-<p:sld xmlns:a="http://schemas.openxmlformats.org/drawingml/2006/main" xmlns:r="http://schemas.openxmlformats.org/officeDocument/2006/relationships" xmlns:p="http://schemas.openxmlformats.org/presentationml/2006/main">
-  <p:cSld>
-    <p:spTree>
-      <p:nvGrpSpPr>
-        <p:cNvPr id="1" name=""/>
-        <p:cNvGrpSpPr/>
-        <p:nvPr/>
-      </p:nvGrpSpPr>
-      <p:grpSpPr>
-        <a:xfrm>
-          <a:off x="0" y="0"/>
-          <a:ext cx="0" cy="0"/>
-          <a:chOff x="0" y="0"/>
-          <a:chExt cx="0" cy="0"/>
-        </a:xfrm>
-      </p:grpSpPr>
-      <p:sp>
-        <p:nvSpPr>
-          <p:cNvPr id="2" name="Title 1"/>
-          <p:cNvSpPr>
-            <a:spLocks noGrp="1"/>
-          </p:cNvSpPr>
-          <p:nvPr>
-            <p:ph type="title"/>
-          </p:nvPr>
-        </p:nvSpPr>
-        <p:spPr/>
-        <p:txBody>
-          <a:bodyPr/>
-          <a:lstStyle/>
-          <a:p>
-            <a:r>
-              <a:rPr lang="en-US" dirty="0" smtClean="0"/>
-              <a:t>Questions</a:t>
-            </a:r>
-            <a:endParaRPr lang="en-US" dirty="0"/>
-          </a:p>
-        </p:txBody>
-      </p:sp>
-      <p:sp>
-        <p:nvSpPr>
-          <p:cNvPr id="3" name="Content Placeholder 2"/>
-          <p:cNvSpPr>
-            <a:spLocks noGrp="1"/>
-          </p:cNvSpPr>
-          <p:nvPr>
-            <p:ph idx="1"/>
-          </p:nvPr>
-        </p:nvSpPr>
-        <p:spPr/>
-        <p:txBody>
-          <a:bodyPr/>
-          <a:lstStyle/>
-          <a:p>
-            <a:r>
-              <a:rPr lang="en-US" dirty="0"/>
-              <a:t>Decks: </a:t>
-            </a:r>
-            <a:r>
-              <a:rPr lang="en-US" dirty="0">
-                <a:hlinkClick r:id="rId2"/>
-              </a:rPr>
-              <a:t>https://github.com/jeffputz</a:t>
-            </a:r>
-            <a:endParaRPr lang="en-US" dirty="0"/>
-          </a:p>
-          <a:p>
-            <a:r>
-              <a:rPr lang="en-US" dirty="0">
-                <a:hlinkClick r:id="rId3"/>
-              </a:rPr>
-              <a:t>jeff@popw.com</a:t>
-            </a:r>
-            <a:r>
-              <a:rPr lang="en-US" dirty="0"/>
-              <a:t> and on the Twitter @</a:t>
-            </a:r>
-            <a:r>
-              <a:rPr lang="en-US" dirty="0" err="1"/>
-              <a:t>jeffputz</a:t>
-            </a:r>
-            <a:endParaRPr lang="en-US" dirty="0"/>
-          </a:p>
-          <a:p>
-            <a:endParaRPr lang="en-US" dirty="0"/>
-          </a:p>
-        </p:txBody>
-      </p:sp>
-    </p:spTree>
-    <p:extLst>
-      <p:ext uri="{BB962C8B-B14F-4D97-AF65-F5344CB8AC3E}">
-        <p14:creationId xmlns:p14="http://schemas.microsoft.com/office/powerpoint/2010/main" val="1613228745"/>
-      </p:ext>
-    </p:extLst>
-  </p:cSld>
-  <p:clrMapOvr>
-    <a:masterClrMapping/>
-  </p:clrMapOvr>
-  <p:timing>
-    <p:tnLst>
-      <p:par>
-        <p:cTn id="1" dur="indefinite" restart="never" nodeType="tmRoot"/>
-      </p:par>
-    </p:tnLst>
-  </p:timing>
-</p:sld>
-</file>
-
-<file path=ppt/slides/slide2.xml><?xml version="1.0" encoding="utf-8"?>
-<p:sld xmlns:a="http://schemas.openxmlformats.org/drawingml/2006/main" xmlns:r="http://schemas.openxmlformats.org/officeDocument/2006/relationships" xmlns:p="http://schemas.openxmlformats.org/presentationml/2006/main">
-  <p:cSld>
-    <p:spTree>
-      <p:nvGrpSpPr>
-        <p:cNvPr id="1" name=""/>
-        <p:cNvGrpSpPr/>
-        <p:nvPr/>
-      </p:nvGrpSpPr>
-      <p:grpSpPr>
-        <a:xfrm>
-          <a:off x="0" y="0"/>
-          <a:ext cx="0" cy="0"/>
-          <a:chOff x="0" y="0"/>
-          <a:chExt cx="0" cy="0"/>
-        </a:xfrm>
-      </p:grpSpPr>
-      <p:sp>
-        <p:nvSpPr>
-          <p:cNvPr id="2" name="Title 1"/>
-          <p:cNvSpPr>
-            <a:spLocks noGrp="1"/>
-          </p:cNvSpPr>
-          <p:nvPr>
-            <p:ph type="title"/>
-          </p:nvPr>
-        </p:nvSpPr>
-        <p:spPr/>
-        <p:txBody>
-          <a:bodyPr/>
-          <a:lstStyle/>
-          <a:p>
-            <a:r>
-              <a:rPr lang="en-US" dirty="0" smtClean="0"/>
-              <a:t>About me</a:t>
-            </a:r>
-            <a:endParaRPr lang="en-US" dirty="0"/>
-          </a:p>
-        </p:txBody>
-      </p:sp>
-      <p:sp>
-        <p:nvSpPr>
-          <p:cNvPr id="3" name="Content Placeholder 2"/>
-          <p:cNvSpPr>
-            <a:spLocks noGrp="1"/>
-          </p:cNvSpPr>
-          <p:nvPr>
-            <p:ph idx="1"/>
-          </p:nvPr>
-        </p:nvSpPr>
-        <p:spPr/>
-        <p:txBody>
-          <a:bodyPr/>
-          <a:lstStyle/>
-          <a:p>
-            <a:r>
-              <a:rPr lang="en-US" dirty="0" smtClean="0"/>
-              <a:t>Working the </a:t>
-            </a:r>
-            <a:r>
-              <a:rPr lang="en-US" dirty="0" err="1" smtClean="0"/>
-              <a:t>softwares</a:t>
-            </a:r>
-            <a:r>
-              <a:rPr lang="en-US" dirty="0" smtClean="0"/>
-              <a:t> since 1999-ish.</a:t>
-            </a:r>
-          </a:p>
-          <a:p>
-            <a:r>
-              <a:rPr lang="en-US" dirty="0" smtClean="0"/>
-              <a:t>Diverse experience, from </a:t>
-            </a:r>
-            <a:r>
-              <a:rPr lang="en-US" dirty="0" err="1" smtClean="0"/>
-              <a:t>megacorps</a:t>
-            </a:r>
-            <a:r>
-              <a:rPr lang="en-US" dirty="0" smtClean="0"/>
-              <a:t> like Microsoft and Humana to startups and dot-com flameouts.</a:t>
-            </a:r>
-          </a:p>
-          <a:p>
-            <a:r>
-              <a:rPr lang="en-US" dirty="0" smtClean="0"/>
-              <a:t>Currently VP of Product Development and Software Engineering for </a:t>
-            </a:r>
-            <a:r>
-              <a:rPr lang="en-US" dirty="0" err="1" smtClean="0"/>
-              <a:t>novi</a:t>
-            </a:r>
-            <a:r>
-              <a:rPr lang="en-US" dirty="0" smtClean="0"/>
-              <a:t> AMS.</a:t>
-            </a:r>
-          </a:p>
-          <a:p>
-            <a:r>
-              <a:rPr lang="en-US" dirty="0" smtClean="0"/>
-              <a:t>Been hiring people on and off for the last ten years.</a:t>
-            </a:r>
-          </a:p>
-          <a:p>
-            <a:r>
-              <a:rPr lang="en-US" dirty="0"/>
-              <a:t>Decks: </a:t>
-            </a:r>
-            <a:r>
-              <a:rPr lang="en-US" dirty="0">
-                <a:hlinkClick r:id="rId2"/>
-              </a:rPr>
-              <a:t>https://</a:t>
-            </a:r>
-            <a:r>
-              <a:rPr lang="en-US" dirty="0" smtClean="0">
-                <a:hlinkClick r:id="rId2"/>
-              </a:rPr>
-              <a:t>github.com/jeffputz</a:t>
-            </a:r>
-            <a:endParaRPr lang="en-US" dirty="0" smtClean="0"/>
-          </a:p>
-          <a:p>
-            <a:r>
-              <a:rPr lang="en-US" dirty="0" smtClean="0">
-                <a:hlinkClick r:id="rId3"/>
-              </a:rPr>
-              <a:t>jeff@popw.com</a:t>
-            </a:r>
-            <a:r>
-              <a:rPr lang="en-US" dirty="0" smtClean="0"/>
-              <a:t> and on the Twitter @</a:t>
-            </a:r>
-            <a:r>
-              <a:rPr lang="en-US" dirty="0" err="1" smtClean="0"/>
-              <a:t>jeffputz</a:t>
-            </a:r>
-            <a:endParaRPr lang="en-US" dirty="0"/>
-          </a:p>
-        </p:txBody>
-      </p:sp>
-    </p:spTree>
-    <p:extLst>
-      <p:ext uri="{BB962C8B-B14F-4D97-AF65-F5344CB8AC3E}">
-        <p14:creationId xmlns:p14="http://schemas.microsoft.com/office/powerpoint/2010/main" val="181294471"/>
-      </p:ext>
-    </p:extLst>
-  </p:cSld>
-  <p:clrMapOvr>
-    <a:masterClrMapping/>
-  </p:clrMapOvr>
-  <p:timing>
-    <p:tnLst>
-      <p:par>
-        <p:cTn id="1" dur="indefinite" restart="never" nodeType="tmRoot"/>
-      </p:par>
-    </p:tnLst>
-  </p:timing>
-</p:sld>
-</file>
-
-<file path=ppt/slides/slide3.xml><?xml version="1.0" encoding="utf-8"?>
-<p:sld xmlns:a="http://schemas.openxmlformats.org/drawingml/2006/main" xmlns:r="http://schemas.openxmlformats.org/officeDocument/2006/relationships" xmlns:p="http://schemas.openxmlformats.org/presentationml/2006/main">
-  <p:cSld>
-    <p:spTree>
-      <p:nvGrpSpPr>
-        <p:cNvPr id="1" name=""/>
-        <p:cNvGrpSpPr/>
-        <p:nvPr/>
-      </p:nvGrpSpPr>
-      <p:grpSpPr>
-        <a:xfrm>
-          <a:off x="0" y="0"/>
-          <a:ext cx="0" cy="0"/>
-          <a:chOff x="0" y="0"/>
-          <a:chExt cx="0" cy="0"/>
-        </a:xfrm>
-      </p:grpSpPr>
-      <p:sp>
-        <p:nvSpPr>
-          <p:cNvPr id="2" name="Title 1"/>
-          <p:cNvSpPr>
-            <a:spLocks noGrp="1"/>
-          </p:cNvSpPr>
-          <p:nvPr>
-            <p:ph type="title"/>
-          </p:nvPr>
-        </p:nvSpPr>
-        <p:spPr/>
-        <p:txBody>
-          <a:bodyPr/>
-          <a:lstStyle/>
-          <a:p>
-            <a:r>
-              <a:rPr lang="en-US" dirty="0" smtClean="0"/>
-              <a:t>Who is this for</a:t>
-            </a:r>
-            <a:endParaRPr lang="en-US" dirty="0"/>
-          </a:p>
-        </p:txBody>
-      </p:sp>
-      <p:sp>
-        <p:nvSpPr>
-          <p:cNvPr id="3" name="Content Placeholder 2"/>
-          <p:cNvSpPr>
-            <a:spLocks noGrp="1"/>
-          </p:cNvSpPr>
-          <p:nvPr>
-            <p:ph idx="1"/>
-          </p:nvPr>
-        </p:nvSpPr>
-        <p:spPr/>
-        <p:txBody>
-          <a:bodyPr/>
-          <a:lstStyle/>
-          <a:p>
-            <a:r>
-              <a:rPr lang="en-US" dirty="0" smtClean="0"/>
-              <a:t>Developers, developers, developers</a:t>
-            </a:r>
-          </a:p>
-          <a:p>
-            <a:r>
-              <a:rPr lang="en-US" dirty="0" smtClean="0"/>
-              <a:t>“Architects”</a:t>
-            </a:r>
-          </a:p>
-          <a:p>
-            <a:r>
-              <a:rPr lang="en-US" dirty="0" smtClean="0"/>
-              <a:t>Skeptical business folk</a:t>
-            </a:r>
-          </a:p>
-          <a:p>
-            <a:r>
-              <a:rPr lang="en-US" dirty="0" smtClean="0"/>
-              <a:t>This is not an argument about scalability, but rather choosing the right tool (scale is different for SQL vs. NoSQL)</a:t>
-            </a:r>
-            <a:endParaRPr lang="en-US" dirty="0"/>
-          </a:p>
-        </p:txBody>
-      </p:sp>
-    </p:spTree>
-    <p:extLst>
-      <p:ext uri="{BB962C8B-B14F-4D97-AF65-F5344CB8AC3E}">
-        <p14:creationId xmlns:p14="http://schemas.microsoft.com/office/powerpoint/2010/main" val="1478897902"/>
-      </p:ext>
-    </p:extLst>
-  </p:cSld>
-  <p:clrMapOvr>
-    <a:masterClrMapping/>
-  </p:clrMapOvr>
-  <p:timing>
-    <p:tnLst>
-      <p:par>
-        <p:cTn id="1" dur="indefinite" restart="never" nodeType="tmRoot">
-          <p:childTnLst>
-            <p:seq concurrent="1" nextAc="seek">
-              <p:cTn id="2" dur="indefinite" nodeType="mainSeq">
-                <p:childTnLst>
-                  <p:par>
-                    <p:cTn id="3" fill="hold">
-                      <p:stCondLst>
-                        <p:cond delay="indefinite"/>
-                      </p:stCondLst>
-                      <p:childTnLst>
-                        <p:par>
-                          <p:cTn id="4" fill="hold">
-                            <p:stCondLst>
-                              <p:cond delay="0"/>
-                            </p:stCondLst>
-                            <p:childTnLst>
-                              <p:par>
-                                <p:cTn id="5" presetID="10" presetClass="entr" presetSubtype="0" fill="hold" grpId="0" nodeType="clickEffect">
-                                  <p:stCondLst>
-                                    <p:cond delay="0"/>
-                                  </p:stCondLst>
-                                  <p:childTnLst>
-                                    <p:set>
-                                      <p:cBhvr>
-                                        <p:cTn id="6" dur="1" fill="hold">
-                                          <p:stCondLst>
-                                            <p:cond delay="0"/>
-                                          </p:stCondLst>
-                                        </p:cTn>
-                                        <p:tgtEl>
-                                          <p:spTgt spid="3">
-                                            <p:txEl>
-                                              <p:pRg st="0" end="0"/>
-                                            </p:txEl>
-                                          </p:spTgt>
-                                        </p:tgtEl>
-                                        <p:attrNameLst>
-                                          <p:attrName>style.visibility</p:attrName>
-                                        </p:attrNameLst>
-                                      </p:cBhvr>
-                                      <p:to>
-                                        <p:strVal val="visible"/>
-                                      </p:to>
-                                    </p:set>
-                                    <p:animEffect transition="in" filter="fade">
-                                      <p:cBhvr>
-                                        <p:cTn id="7" dur="500"/>
-                                        <p:tgtEl>
-                                          <p:spTgt spid="3">
-                                            <p:txEl>
-                                              <p:pRg st="0" end="0"/>
-                                            </p:txEl>
-                                          </p:spTgt>
-                                        </p:tgtEl>
-                                      </p:cBhvr>
-                                    </p:animEffect>
-                                  </p:childTnLst>
-                                </p:cTn>
-                              </p:par>
-                            </p:childTnLst>
-                          </p:cTn>
-                        </p:par>
-                      </p:childTnLst>
-                    </p:cTn>
-                  </p:par>
-                  <p:par>
-                    <p:cTn id="8" fill="hold">
-                      <p:stCondLst>
-                        <p:cond delay="indefinite"/>
-                      </p:stCondLst>
-                      <p:childTnLst>
-                        <p:par>
-                          <p:cTn id="9" fill="hold">
-                            <p:stCondLst>
-                              <p:cond delay="0"/>
-                            </p:stCondLst>
-                            <p:childTnLst>
-                              <p:par>
-                                <p:cTn id="10" presetID="10" presetClass="entr" presetSubtype="0" fill="hold" grpId="0" nodeType="clickEffect">
-                                  <p:stCondLst>
-                                    <p:cond delay="0"/>
-                                  </p:stCondLst>
-                                  <p:childTnLst>
-                                    <p:set>
-                                      <p:cBhvr>
-                                        <p:cTn id="11" dur="1" fill="hold">
-                                          <p:stCondLst>
-                                            <p:cond delay="0"/>
-                                          </p:stCondLst>
-                                        </p:cTn>
-                                        <p:tgtEl>
-                                          <p:spTgt spid="3">
-                                            <p:txEl>
-                                              <p:pRg st="1" end="1"/>
-                                            </p:txEl>
-                                          </p:spTgt>
-                                        </p:tgtEl>
-                                        <p:attrNameLst>
-                                          <p:attrName>style.visibility</p:attrName>
-                                        </p:attrNameLst>
-                                      </p:cBhvr>
-                                      <p:to>
-                                        <p:strVal val="visible"/>
-                                      </p:to>
-                                    </p:set>
-                                    <p:animEffect transition="in" filter="fade">
-                                      <p:cBhvr>
-                                        <p:cTn id="12" dur="500"/>
-                                        <p:tgtEl>
-                                          <p:spTgt spid="3">
-                                            <p:txEl>
-                                              <p:pRg st="1" end="1"/>
-                                            </p:txEl>
-                                          </p:spTgt>
-                                        </p:tgtEl>
-                                      </p:cBhvr>
-                                    </p:animEffect>
-                                  </p:childTnLst>
-                                </p:cTn>
-                              </p:par>
-                            </p:childTnLst>
-                          </p:cTn>
-                        </p:par>
-                      </p:childTnLst>
-                    </p:cTn>
-                  </p:par>
-                  <p:par>
-                    <p:cTn id="13" fill="hold">
-                      <p:stCondLst>
-                        <p:cond delay="indefinite"/>
-                      </p:stCondLst>
-                      <p:childTnLst>
-                        <p:par>
-                          <p:cTn id="14" fill="hold">
-                            <p:stCondLst>
-                              <p:cond delay="0"/>
-                            </p:stCondLst>
-                            <p:childTnLst>
-                              <p:par>
-                                <p:cTn id="15" presetID="10" presetClass="entr" presetSubtype="0" fill="hold" grpId="0" nodeType="clickEffect">
-                                  <p:stCondLst>
-                                    <p:cond delay="0"/>
-                                  </p:stCondLst>
-                                  <p:childTnLst>
-                                    <p:set>
-                                      <p:cBhvr>
-                                        <p:cTn id="16" dur="1" fill="hold">
-                                          <p:stCondLst>
-                                            <p:cond delay="0"/>
-                                          </p:stCondLst>
-                                        </p:cTn>
-                                        <p:tgtEl>
-                                          <p:spTgt spid="3">
-                                            <p:txEl>
-                                              <p:pRg st="2" end="2"/>
-                                            </p:txEl>
-                                          </p:spTgt>
-                                        </p:tgtEl>
-                                        <p:attrNameLst>
-                                          <p:attrName>style.visibility</p:attrName>
-                                        </p:attrNameLst>
-                                      </p:cBhvr>
-                                      <p:to>
-                                        <p:strVal val="visible"/>
-                                      </p:to>
-                                    </p:set>
-                                    <p:animEffect transition="in" filter="fade">
-                                      <p:cBhvr>
-                                        <p:cTn id="17" dur="500"/>
-                                        <p:tgtEl>
-                                          <p:spTgt spid="3">
-                                            <p:txEl>
-                                              <p:pRg st="2" end="2"/>
-                                            </p:txEl>
-                                          </p:spTgt>
-                                        </p:tgtEl>
-                                      </p:cBhvr>
-                                    </p:animEffect>
-                                  </p:childTnLst>
-                                </p:cTn>
-                              </p:par>
-                            </p:childTnLst>
-                          </p:cTn>
-                        </p:par>
-                      </p:childTnLst>
-                    </p:cTn>
-                  </p:par>
-                  <p:par>
-                    <p:cTn id="18" fill="hold">
-                      <p:stCondLst>
-                        <p:cond delay="indefinite"/>
-                      </p:stCondLst>
-                      <p:childTnLst>
-                        <p:par>
-                          <p:cTn id="19" fill="hold">
-                            <p:stCondLst>
-                              <p:cond delay="0"/>
-                            </p:stCondLst>
-                            <p:childTnLst>
-                              <p:par>
-                                <p:cTn id="20" presetID="10" presetClass="entr" presetSubtype="0" fill="hold" grpId="0" nodeType="clickEffect">
-                                  <p:stCondLst>
-                                    <p:cond delay="0"/>
-                                  </p:stCondLst>
-                                  <p:childTnLst>
-                                    <p:set>
-                                      <p:cBhvr>
-                                        <p:cTn id="21" dur="1" fill="hold">
-                                          <p:stCondLst>
-                                            <p:cond delay="0"/>
-                                          </p:stCondLst>
-                                        </p:cTn>
-                                        <p:tgtEl>
-                                          <p:spTgt spid="3">
-                                            <p:txEl>
-                                              <p:pRg st="3" end="3"/>
-                                            </p:txEl>
-                                          </p:spTgt>
-                                        </p:tgtEl>
-                                        <p:attrNameLst>
-                                          <p:attrName>style.visibility</p:attrName>
-                                        </p:attrNameLst>
-                                      </p:cBhvr>
-                                      <p:to>
-                                        <p:strVal val="visible"/>
-                                      </p:to>
-                                    </p:set>
-                                    <p:animEffect transition="in" filter="fade">
-                                      <p:cBhvr>
-                                        <p:cTn id="22" dur="500"/>
-                                        <p:tgtEl>
-                                          <p:spTgt spid="3">
-                                            <p:txEl>
-                                              <p:pRg st="3" end="3"/>
-                                            </p:txEl>
-                                          </p:spTgt>
-                                        </p:tgtEl>
-                                      </p:cBhvr>
-                                    </p:animEffect>
-                                  </p:childTnLst>
-                                </p:cTn>
-                              </p:par>
-                            </p:childTnLst>
-                          </p:cTn>
-                        </p:par>
-                      </p:childTnLst>
-                    </p:cTn>
-                  </p:par>
-                </p:childTnLst>
-              </p:cTn>
-              <p:prevCondLst>
-                <p:cond evt="onPrev" delay="0">
-                  <p:tgtEl>
-                    <p:sldTgt/>
-                  </p:tgtEl>
-                </p:cond>
-              </p:prevCondLst>
-              <p:nextCondLst>
-                <p:cond evt="onNext" delay="0">
-                  <p:tgtEl>
-                    <p:sldTgt/>
-                  </p:tgtEl>
-                </p:cond>
-              </p:nextCondLst>
-            </p:seq>
-          </p:childTnLst>
-        </p:cTn>
-      </p:par>
-    </p:tnLst>
-    <p:bldLst>
-      <p:bldP spid="3" grpId="0" build="p"/>
-    </p:bldLst>
-  </p:timing>
-</p:sld>
-</file>
-
-<file path=ppt/slides/slide4.xml><?xml version="1.0" encoding="utf-8"?>
-<p:sld xmlns:a="http://schemas.openxmlformats.org/drawingml/2006/main" xmlns:r="http://schemas.openxmlformats.org/officeDocument/2006/relationships" xmlns:p="http://schemas.openxmlformats.org/presentationml/2006/main">
-  <p:cSld>
-    <p:spTree>
-      <p:nvGrpSpPr>
-        <p:cNvPr id="1" name=""/>
-        <p:cNvGrpSpPr/>
-        <p:nvPr/>
-      </p:nvGrpSpPr>
-      <p:grpSpPr>
-        <a:xfrm>
-          <a:off x="0" y="0"/>
-          <a:ext cx="0" cy="0"/>
-          <a:chOff x="0" y="0"/>
-          <a:chExt cx="0" cy="0"/>
-        </a:xfrm>
-      </p:grpSpPr>
-      <p:sp>
-        <p:nvSpPr>
-          <p:cNvPr id="4" name="TextBox 3"/>
-          <p:cNvSpPr txBox="1"/>
-          <p:nvPr/>
-        </p:nvSpPr>
-        <p:spPr>
-          <a:xfrm>
-            <a:off x="3690851" y="0"/>
-            <a:ext cx="4522123" cy="1569660"/>
-          </a:xfrm>
-          <a:prstGeom prst="rect">
-            <a:avLst/>
-          </a:prstGeom>
-          <a:noFill/>
-        </p:spPr>
-        <p:txBody>
-          <a:bodyPr wrap="square" rtlCol="0">
-            <a:spAutoFit/>
-          </a:bodyPr>
-          <a:lstStyle/>
-          <a:p>
-            <a:pPr algn="ctr"/>
-            <a:r>
-              <a:rPr lang="en-US" sz="9600" dirty="0" smtClean="0"/>
-              <a:t>2010</a:t>
-            </a:r>
-            <a:endParaRPr lang="en-US" sz="9600" dirty="0"/>
-          </a:p>
-        </p:txBody>
-      </p:sp>
-      <p:pic>
-        <p:nvPicPr>
-          <p:cNvPr id="5" name="Picture 4"/>
-          <p:cNvPicPr>
-            <a:picLocks noChangeAspect="1"/>
-          </p:cNvPicPr>
-          <p:nvPr/>
-        </p:nvPicPr>
-        <p:blipFill>
-          <a:blip r:embed="rId2">
-            <a:extLst>
-              <a:ext uri="{28A0092B-C50C-407E-A947-70E740481C1C}">
-                <a14:useLocalDpi xmlns:a14="http://schemas.microsoft.com/office/drawing/2010/main" val="0"/>
-              </a:ext>
-            </a:extLst>
-          </a:blip>
-          <a:stretch>
-            <a:fillRect/>
-          </a:stretch>
-        </p:blipFill>
-        <p:spPr>
-          <a:xfrm>
-            <a:off x="2431036" y="1401157"/>
-            <a:ext cx="7041752" cy="4999644"/>
-          </a:xfrm>
-          <a:prstGeom prst="rect">
-            <a:avLst/>
-          </a:prstGeom>
-        </p:spPr>
-      </p:pic>
-    </p:spTree>
-    <p:extLst>
-      <p:ext uri="{BB962C8B-B14F-4D97-AF65-F5344CB8AC3E}">
-        <p14:creationId xmlns:p14="http://schemas.microsoft.com/office/powerpoint/2010/main" val="1562678716"/>
-      </p:ext>
-    </p:extLst>
-  </p:cSld>
-  <p:clrMapOvr>
-    <a:masterClrMapping/>
-  </p:clrMapOvr>
-  <p:timing>
-    <p:tnLst>
-      <p:par>
-        <p:cTn id="1" dur="indefinite" restart="never" nodeType="tmRoot"/>
-      </p:par>
-    </p:tnLst>
-  </p:timing>
-</p:sld>
-</file>
-
-<file path=ppt/slides/slide5.xml><?xml version="1.0" encoding="utf-8"?>
-<p:sld xmlns:a="http://schemas.openxmlformats.org/drawingml/2006/main" xmlns:r="http://schemas.openxmlformats.org/officeDocument/2006/relationships" xmlns:p="http://schemas.openxmlformats.org/presentationml/2006/main">
-  <p:cSld>
-    <p:spTree>
-      <p:nvGrpSpPr>
-        <p:cNvPr id="1" name=""/>
-        <p:cNvGrpSpPr/>
-        <p:nvPr/>
-      </p:nvGrpSpPr>
-      <p:grpSpPr>
-        <a:xfrm>
-          <a:off x="0" y="0"/>
-          <a:ext cx="0" cy="0"/>
-          <a:chOff x="0" y="0"/>
-          <a:chExt cx="0" cy="0"/>
-        </a:xfrm>
-      </p:grpSpPr>
-      <p:sp>
-        <p:nvSpPr>
-          <p:cNvPr id="2" name="Title 1"/>
-          <p:cNvSpPr>
-            <a:spLocks noGrp="1"/>
-          </p:cNvSpPr>
-          <p:nvPr>
-            <p:ph type="title"/>
-          </p:nvPr>
-        </p:nvSpPr>
-        <p:spPr/>
-        <p:txBody>
-          <a:bodyPr/>
-          <a:lstStyle/>
-          <a:p>
-            <a:r>
-              <a:rPr lang="en-US" dirty="0" smtClean="0"/>
-              <a:t>To SQL or not to SQL</a:t>
-            </a:r>
-            <a:endParaRPr lang="en-US" dirty="0"/>
-          </a:p>
-        </p:txBody>
-      </p:sp>
-      <p:sp>
-        <p:nvSpPr>
-          <p:cNvPr id="3" name="Content Placeholder 2"/>
-          <p:cNvSpPr>
-            <a:spLocks noGrp="1"/>
-          </p:cNvSpPr>
-          <p:nvPr>
-            <p:ph idx="1"/>
-          </p:nvPr>
-        </p:nvSpPr>
-        <p:spPr/>
-        <p:txBody>
-          <a:bodyPr/>
-          <a:lstStyle/>
-          <a:p>
-            <a:r>
-              <a:rPr lang="en-US" dirty="0" smtClean="0"/>
-              <a:t>Does your data have relationships? Parent/child relationships are the biggest reason for this. Use SQL.</a:t>
-            </a:r>
-          </a:p>
-          <a:p>
-            <a:r>
-              <a:rPr lang="en-US" dirty="0" smtClean="0"/>
-              <a:t>Have unstructured data, data retrieved by a single key, documents, blobs? Use NoSQL.</a:t>
-            </a:r>
-          </a:p>
-          <a:p>
-            <a:r>
-              <a:rPr lang="en-US" dirty="0" smtClean="0"/>
-              <a:t>Does your schema change a lot, is querying reasonably specific and are do you have specific throughput targets? NoSQL, but get ready to research your options.</a:t>
-            </a:r>
-          </a:p>
-          <a:p>
-            <a:r>
-              <a:rPr lang="en-US" dirty="0" smtClean="0"/>
-              <a:t>What experience does your team have? SQL is cheaper to support because everyone knows it. Also: SQL can probably do what you need.</a:t>
-            </a:r>
-          </a:p>
-          <a:p>
-            <a:endParaRPr lang="en-US" dirty="0"/>
-          </a:p>
-        </p:txBody>
-      </p:sp>
-    </p:spTree>
-    <p:extLst>
-      <p:ext uri="{BB962C8B-B14F-4D97-AF65-F5344CB8AC3E}">
-        <p14:creationId xmlns:p14="http://schemas.microsoft.com/office/powerpoint/2010/main" val="1742395677"/>
-      </p:ext>
-    </p:extLst>
-  </p:cSld>
-  <p:clrMapOvr>
-    <a:masterClrMapping/>
-  </p:clrMapOvr>
-  <p:timing>
-    <p:tnLst>
-      <p:par>
-        <p:cTn id="1" dur="indefinite" restart="never" nodeType="tmRoot">
-          <p:childTnLst>
-            <p:seq concurrent="1" nextAc="seek">
-              <p:cTn id="2" dur="indefinite" nodeType="mainSeq">
-                <p:childTnLst>
-                  <p:par>
-                    <p:cTn id="3" fill="hold">
-                      <p:stCondLst>
-                        <p:cond delay="indefinite"/>
-                      </p:stCondLst>
-                      <p:childTnLst>
-                        <p:par>
-                          <p:cTn id="4" fill="hold">
-                            <p:stCondLst>
-                              <p:cond delay="0"/>
-                            </p:stCondLst>
-                            <p:childTnLst>
-                              <p:par>
-                                <p:cTn id="5" presetID="10" presetClass="entr" presetSubtype="0" fill="hold" grpId="0" nodeType="clickEffect">
-                                  <p:stCondLst>
-                                    <p:cond delay="0"/>
-                                  </p:stCondLst>
-                                  <p:childTnLst>
-                                    <p:set>
-                                      <p:cBhvr>
-                                        <p:cTn id="6" dur="1" fill="hold">
-                                          <p:stCondLst>
-                                            <p:cond delay="0"/>
-                                          </p:stCondLst>
-                                        </p:cTn>
-                                        <p:tgtEl>
-                                          <p:spTgt spid="3">
-                                            <p:txEl>
-                                              <p:pRg st="0" end="0"/>
-                                            </p:txEl>
-                                          </p:spTgt>
-                                        </p:tgtEl>
-                                        <p:attrNameLst>
-                                          <p:attrName>style.visibility</p:attrName>
-                                        </p:attrNameLst>
-                                      </p:cBhvr>
-                                      <p:to>
-                                        <p:strVal val="visible"/>
-                                      </p:to>
-                                    </p:set>
-                                    <p:animEffect transition="in" filter="fade">
-                                      <p:cBhvr>
-                                        <p:cTn id="7" dur="500"/>
-                                        <p:tgtEl>
-                                          <p:spTgt spid="3">
-                                            <p:txEl>
-                                              <p:pRg st="0" end="0"/>
-                                            </p:txEl>
-                                          </p:spTgt>
-                                        </p:tgtEl>
-                                      </p:cBhvr>
-                                    </p:animEffect>
-                                  </p:childTnLst>
-                                </p:cTn>
-                              </p:par>
-                            </p:childTnLst>
-                          </p:cTn>
-                        </p:par>
-                      </p:childTnLst>
-                    </p:cTn>
-                  </p:par>
-                  <p:par>
-                    <p:cTn id="8" fill="hold">
-                      <p:stCondLst>
-                        <p:cond delay="indefinite"/>
-                      </p:stCondLst>
-                      <p:childTnLst>
-                        <p:par>
-                          <p:cTn id="9" fill="hold">
-                            <p:stCondLst>
-                              <p:cond delay="0"/>
-                            </p:stCondLst>
-                            <p:childTnLst>
-                              <p:par>
-                                <p:cTn id="10" presetID="10" presetClass="entr" presetSubtype="0" fill="hold" grpId="0" nodeType="clickEffect">
-                                  <p:stCondLst>
-                                    <p:cond delay="0"/>
-                                  </p:stCondLst>
-                                  <p:childTnLst>
-                                    <p:set>
-                                      <p:cBhvr>
-                                        <p:cTn id="11" dur="1" fill="hold">
-                                          <p:stCondLst>
-                                            <p:cond delay="0"/>
-                                          </p:stCondLst>
-                                        </p:cTn>
-                                        <p:tgtEl>
-                                          <p:spTgt spid="3">
-                                            <p:txEl>
-                                              <p:pRg st="1" end="1"/>
-                                            </p:txEl>
-                                          </p:spTgt>
-                                        </p:tgtEl>
-                                        <p:attrNameLst>
-                                          <p:attrName>style.visibility</p:attrName>
-                                        </p:attrNameLst>
-                                      </p:cBhvr>
-                                      <p:to>
-                                        <p:strVal val="visible"/>
-                                      </p:to>
-                                    </p:set>
-                                    <p:animEffect transition="in" filter="fade">
-                                      <p:cBhvr>
-                                        <p:cTn id="12" dur="500"/>
-                                        <p:tgtEl>
-                                          <p:spTgt spid="3">
-                                            <p:txEl>
-                                              <p:pRg st="1" end="1"/>
-                                            </p:txEl>
-                                          </p:spTgt>
-                                        </p:tgtEl>
-                                      </p:cBhvr>
-                                    </p:animEffect>
-                                  </p:childTnLst>
-                                </p:cTn>
-                              </p:par>
-                            </p:childTnLst>
-                          </p:cTn>
-                        </p:par>
-                      </p:childTnLst>
-                    </p:cTn>
-                  </p:par>
-                  <p:par>
-                    <p:cTn id="13" fill="hold">
-                      <p:stCondLst>
-                        <p:cond delay="indefinite"/>
-                      </p:stCondLst>
-                      <p:childTnLst>
-                        <p:par>
-                          <p:cTn id="14" fill="hold">
-                            <p:stCondLst>
-                              <p:cond delay="0"/>
-                            </p:stCondLst>
-                            <p:childTnLst>
-                              <p:par>
-                                <p:cTn id="15" presetID="10" presetClass="entr" presetSubtype="0" fill="hold" grpId="0" nodeType="clickEffect">
-                                  <p:stCondLst>
-                                    <p:cond delay="0"/>
-                                  </p:stCondLst>
-                                  <p:childTnLst>
-                                    <p:set>
-                                      <p:cBhvr>
-                                        <p:cTn id="16" dur="1" fill="hold">
-                                          <p:stCondLst>
-                                            <p:cond delay="0"/>
-                                          </p:stCondLst>
-                                        </p:cTn>
-                                        <p:tgtEl>
-                                          <p:spTgt spid="3">
-                                            <p:txEl>
-                                              <p:pRg st="2" end="2"/>
-                                            </p:txEl>
-                                          </p:spTgt>
-                                        </p:tgtEl>
-                                        <p:attrNameLst>
-                                          <p:attrName>style.visibility</p:attrName>
-                                        </p:attrNameLst>
-                                      </p:cBhvr>
-                                      <p:to>
-                                        <p:strVal val="visible"/>
-                                      </p:to>
-                                    </p:set>
-                                    <p:animEffect transition="in" filter="fade">
-                                      <p:cBhvr>
-                                        <p:cTn id="17" dur="500"/>
-                                        <p:tgtEl>
-                                          <p:spTgt spid="3">
-                                            <p:txEl>
-                                              <p:pRg st="2" end="2"/>
-                                            </p:txEl>
-                                          </p:spTgt>
-                                        </p:tgtEl>
-                                      </p:cBhvr>
-                                    </p:animEffect>
-                                  </p:childTnLst>
-                                </p:cTn>
-                              </p:par>
-                            </p:childTnLst>
-                          </p:cTn>
-                        </p:par>
-                      </p:childTnLst>
-                    </p:cTn>
-                  </p:par>
-                  <p:par>
-                    <p:cTn id="18" fill="hold">
-                      <p:stCondLst>
-                        <p:cond delay="indefinite"/>
-                      </p:stCondLst>
-                      <p:childTnLst>
-                        <p:par>
-                          <p:cTn id="19" fill="hold">
-                            <p:stCondLst>
-                              <p:cond delay="0"/>
-                            </p:stCondLst>
-                            <p:childTnLst>
-                              <p:par>
-                                <p:cTn id="20" presetID="10" presetClass="entr" presetSubtype="0" fill="hold" grpId="0" nodeType="clickEffect">
-                                  <p:stCondLst>
-                                    <p:cond delay="0"/>
-                                  </p:stCondLst>
-                                  <p:childTnLst>
-                                    <p:set>
-                                      <p:cBhvr>
-                                        <p:cTn id="21" dur="1" fill="hold">
-                                          <p:stCondLst>
-                                            <p:cond delay="0"/>
-                                          </p:stCondLst>
-                                        </p:cTn>
-                                        <p:tgtEl>
-                                          <p:spTgt spid="3">
-                                            <p:txEl>
-                                              <p:pRg st="3" end="3"/>
-                                            </p:txEl>
-                                          </p:spTgt>
-                                        </p:tgtEl>
-                                        <p:attrNameLst>
-                                          <p:attrName>style.visibility</p:attrName>
-                                        </p:attrNameLst>
-                                      </p:cBhvr>
-                                      <p:to>
-                                        <p:strVal val="visible"/>
-                                      </p:to>
-                                    </p:set>
-                                    <p:animEffect transition="in" filter="fade">
-                                      <p:cBhvr>
-                                        <p:cTn id="22" dur="500"/>
-                                        <p:tgtEl>
-                                          <p:spTgt spid="3">
-                                            <p:txEl>
-                                              <p:pRg st="3" end="3"/>
-                                            </p:txEl>
-                                          </p:spTgt>
-                                        </p:tgtEl>
-                                      </p:cBhvr>
-                                    </p:animEffect>
-                                  </p:childTnLst>
-                                </p:cTn>
-                              </p:par>
-                            </p:childTnLst>
-                          </p:cTn>
-                        </p:par>
-                      </p:childTnLst>
-                    </p:cTn>
-                  </p:par>
-                </p:childTnLst>
-              </p:cTn>
-              <p:prevCondLst>
-                <p:cond evt="onPrev" delay="0">
-                  <p:tgtEl>
-                    <p:sldTgt/>
-                  </p:tgtEl>
-                </p:cond>
-              </p:prevCondLst>
-              <p:nextCondLst>
-                <p:cond evt="onNext" delay="0">
-                  <p:tgtEl>
-                    <p:sldTgt/>
-                  </p:tgtEl>
-                </p:cond>
-              </p:nextCondLst>
-            </p:seq>
-          </p:childTnLst>
-        </p:cTn>
-      </p:par>
-    </p:tnLst>
-    <p:bldLst>
-      <p:bldP spid="3" grpId="0" build="p"/>
-    </p:bldLst>
-  </p:timing>
-</p:sld>
-</file>
-
-<file path=ppt/slides/slide6.xml><?xml version="1.0" encoding="utf-8"?>
-<p:sld xmlns:a="http://schemas.openxmlformats.org/drawingml/2006/main" xmlns:r="http://schemas.openxmlformats.org/officeDocument/2006/relationships" xmlns:p="http://schemas.openxmlformats.org/presentationml/2006/main">
-  <p:cSld>
-    <p:spTree>
-      <p:nvGrpSpPr>
-        <p:cNvPr id="1" name=""/>
-        <p:cNvGrpSpPr/>
-        <p:nvPr/>
-      </p:nvGrpSpPr>
-      <p:grpSpPr>
-        <a:xfrm>
-          <a:off x="0" y="0"/>
-          <a:ext cx="0" cy="0"/>
-          <a:chOff x="0" y="0"/>
-          <a:chExt cx="0" cy="0"/>
-        </a:xfrm>
-      </p:grpSpPr>
-      <p:sp>
-        <p:nvSpPr>
-          <p:cNvPr id="2" name="Title 1"/>
-          <p:cNvSpPr>
-            <a:spLocks noGrp="1"/>
-          </p:cNvSpPr>
-          <p:nvPr>
-            <p:ph type="title"/>
-          </p:nvPr>
-        </p:nvSpPr>
-        <p:spPr/>
-        <p:txBody>
-          <a:bodyPr/>
-          <a:lstStyle/>
-          <a:p>
-            <a:r>
-              <a:rPr lang="en-US" dirty="0" smtClean="0"/>
-              <a:t>What problems does NoSQL solve?</a:t>
-            </a:r>
-            <a:endParaRPr lang="en-US" dirty="0"/>
-          </a:p>
-        </p:txBody>
-      </p:sp>
-      <p:sp>
-        <p:nvSpPr>
-          <p:cNvPr id="3" name="Content Placeholder 2"/>
-          <p:cNvSpPr>
-            <a:spLocks noGrp="1"/>
-          </p:cNvSpPr>
-          <p:nvPr>
-            <p:ph idx="1"/>
-          </p:nvPr>
-        </p:nvSpPr>
-        <p:spPr/>
-        <p:txBody>
-          <a:bodyPr/>
-          <a:lstStyle/>
-          <a:p>
-            <a:r>
-              <a:rPr lang="en-US" dirty="0" smtClean="0"/>
-              <a:t>Computationally less expensive, depending on which system.</a:t>
-            </a:r>
-          </a:p>
-          <a:p>
-            <a:r>
-              <a:rPr lang="en-US" dirty="0" smtClean="0"/>
-              <a:t>Crazy throughput, especially for writes, also depending on system.</a:t>
-            </a:r>
-          </a:p>
-          <a:p>
-            <a:r>
-              <a:rPr lang="en-US" dirty="0" smtClean="0"/>
-              <a:t>Tons of options, many in managed cloud offerings.</a:t>
-            </a:r>
-          </a:p>
-          <a:p>
-            <a:r>
-              <a:rPr lang="en-US" dirty="0" smtClean="0"/>
-              <a:t>Many are open source, so licensing is not a component of cost.</a:t>
-            </a:r>
-          </a:p>
-          <a:p>
-            <a:r>
-              <a:rPr lang="en-US" dirty="0" smtClean="0"/>
-              <a:t>Simple API’s, usually RESTful, so they’re platform agnostic (though let’s be honest, you can use SQL variants everywhere too).</a:t>
-            </a:r>
-          </a:p>
-          <a:p>
-            <a:r>
-              <a:rPr lang="en-US" dirty="0" smtClean="0"/>
-              <a:t>Using NoSQL and thinking in the simplest terms is good practice for better SQL.</a:t>
-            </a:r>
-            <a:endParaRPr lang="en-US" dirty="0"/>
-          </a:p>
-        </p:txBody>
-      </p:sp>
-    </p:spTree>
-    <p:extLst>
-      <p:ext uri="{BB962C8B-B14F-4D97-AF65-F5344CB8AC3E}">
-        <p14:creationId xmlns:p14="http://schemas.microsoft.com/office/powerpoint/2010/main" val="1342712560"/>
       </p:ext>
     </p:extLst>
   </p:cSld>
@@ -8739,7 +7080,7 @@
 </p:sld>
 </file>
 
-<file path=ppt/slides/slide7.xml><?xml version="1.0" encoding="utf-8"?>
+<file path=ppt/slides/slide13.xml><?xml version="1.0" encoding="utf-8"?>
 <p:sld xmlns:a="http://schemas.openxmlformats.org/drawingml/2006/main" xmlns:r="http://schemas.openxmlformats.org/officeDocument/2006/relationships" xmlns:p="http://schemas.openxmlformats.org/presentationml/2006/main">
   <p:cSld>
     <p:spTree>
@@ -8756,40 +7097,188 @@
           <a:chExt cx="0" cy="0"/>
         </a:xfrm>
       </p:grpSpPr>
-      <p:pic>
-        <p:nvPicPr>
-          <p:cNvPr id="2" name="Picture 1"/>
-          <p:cNvPicPr>
-            <a:picLocks noChangeAspect="1"/>
-          </p:cNvPicPr>
-          <p:nvPr/>
-        </p:nvPicPr>
-        <p:blipFill>
-          <a:blip r:embed="rId2">
-            <a:extLst>
-              <a:ext uri="{28A0092B-C50C-407E-A947-70E740481C1C}">
-                <a14:useLocalDpi xmlns:a14="http://schemas.microsoft.com/office/drawing/2010/main" val="0"/>
-              </a:ext>
-            </a:extLst>
-          </a:blip>
-          <a:stretch>
-            <a:fillRect/>
-          </a:stretch>
-        </p:blipFill>
-        <p:spPr>
-          <a:xfrm>
-            <a:off x="1080653" y="812338"/>
-            <a:ext cx="10015285" cy="5405581"/>
-          </a:xfrm>
-          <a:prstGeom prst="rect">
-            <a:avLst/>
-          </a:prstGeom>
-        </p:spPr>
-      </p:pic>
+      <p:sp>
+        <p:nvSpPr>
+          <p:cNvPr id="2" name="Title 1"/>
+          <p:cNvSpPr>
+            <a:spLocks noGrp="1"/>
+          </p:cNvSpPr>
+          <p:nvPr>
+            <p:ph type="title"/>
+          </p:nvPr>
+        </p:nvSpPr>
+        <p:spPr/>
+        <p:txBody>
+          <a:bodyPr/>
+          <a:lstStyle/>
+          <a:p>
+            <a:r>
+              <a:rPr lang="en-US" dirty="0" smtClean="0"/>
+              <a:t>Real-world anecdotes</a:t>
+            </a:r>
+            <a:endParaRPr lang="en-US" dirty="0"/>
+          </a:p>
+        </p:txBody>
+      </p:sp>
+      <p:sp>
+        <p:nvSpPr>
+          <p:cNvPr id="3" name="Content Placeholder 2"/>
+          <p:cNvSpPr>
+            <a:spLocks noGrp="1"/>
+          </p:cNvSpPr>
+          <p:nvPr>
+            <p:ph idx="1"/>
+          </p:nvPr>
+        </p:nvSpPr>
+        <p:spPr/>
+        <p:txBody>
+          <a:bodyPr/>
+          <a:lstStyle/>
+          <a:p>
+            <a:r>
+              <a:rPr lang="en-US" dirty="0" smtClean="0"/>
+              <a:t>SQL: Report storage, tabular data serialized and stored in a single row, rehydrated easily to HTML tables or CSV’s.</a:t>
+            </a:r>
+          </a:p>
+          <a:p>
+            <a:r>
+              <a:rPr lang="en-US" dirty="0" smtClean="0"/>
+              <a:t>NoSQL (table): State management for worker processes.</a:t>
+            </a:r>
+          </a:p>
+          <a:p>
+            <a:r>
+              <a:rPr lang="en-US" dirty="0" smtClean="0"/>
+              <a:t>SQL + NoSQL (</a:t>
+            </a:r>
+            <a:r>
+              <a:rPr lang="en-US" dirty="0" err="1" smtClean="0"/>
+              <a:t>Redis</a:t>
+            </a:r>
+            <a:r>
+              <a:rPr lang="en-US" dirty="0" smtClean="0"/>
+              <a:t>): Distributed, two-level cache enabled by messaging.</a:t>
+            </a:r>
+          </a:p>
+          <a:p>
+            <a:r>
+              <a:rPr lang="en-US" dirty="0" smtClean="0"/>
+              <a:t>SQL + Search (AWS, Azure or even Lucene over storage): Fast search </a:t>
+            </a:r>
+            <a:r>
+              <a:rPr lang="en-US" smtClean="0"/>
+              <a:t>results with ID’s to SQL entities.</a:t>
+            </a:r>
+            <a:endParaRPr lang="en-US" dirty="0"/>
+          </a:p>
+        </p:txBody>
+      </p:sp>
     </p:spTree>
     <p:extLst>
       <p:ext uri="{BB962C8B-B14F-4D97-AF65-F5344CB8AC3E}">
-        <p14:creationId xmlns:p14="http://schemas.microsoft.com/office/powerpoint/2010/main" val="427364852"/>
+        <p14:creationId xmlns:p14="http://schemas.microsoft.com/office/powerpoint/2010/main" val="48595405"/>
+      </p:ext>
+    </p:extLst>
+  </p:cSld>
+  <p:clrMapOvr>
+    <a:masterClrMapping/>
+  </p:clrMapOvr>
+</p:sld>
+</file>
+
+<file path=ppt/slides/slide14.xml><?xml version="1.0" encoding="utf-8"?>
+<p:sld xmlns:a="http://schemas.openxmlformats.org/drawingml/2006/main" xmlns:r="http://schemas.openxmlformats.org/officeDocument/2006/relationships" xmlns:p="http://schemas.openxmlformats.org/presentationml/2006/main">
+  <p:cSld>
+    <p:spTree>
+      <p:nvGrpSpPr>
+        <p:cNvPr id="1" name=""/>
+        <p:cNvGrpSpPr/>
+        <p:nvPr/>
+      </p:nvGrpSpPr>
+      <p:grpSpPr>
+        <a:xfrm>
+          <a:off x="0" y="0"/>
+          <a:ext cx="0" cy="0"/>
+          <a:chOff x="0" y="0"/>
+          <a:chExt cx="0" cy="0"/>
+        </a:xfrm>
+      </p:grpSpPr>
+      <p:sp>
+        <p:nvSpPr>
+          <p:cNvPr id="2" name="Title 1"/>
+          <p:cNvSpPr>
+            <a:spLocks noGrp="1"/>
+          </p:cNvSpPr>
+          <p:nvPr>
+            <p:ph type="title"/>
+          </p:nvPr>
+        </p:nvSpPr>
+        <p:spPr/>
+        <p:txBody>
+          <a:bodyPr/>
+          <a:lstStyle/>
+          <a:p>
+            <a:r>
+              <a:rPr lang="en-US" dirty="0" smtClean="0"/>
+              <a:t>Questions</a:t>
+            </a:r>
+            <a:endParaRPr lang="en-US" dirty="0"/>
+          </a:p>
+        </p:txBody>
+      </p:sp>
+      <p:sp>
+        <p:nvSpPr>
+          <p:cNvPr id="3" name="Content Placeholder 2"/>
+          <p:cNvSpPr>
+            <a:spLocks noGrp="1"/>
+          </p:cNvSpPr>
+          <p:nvPr>
+            <p:ph idx="1"/>
+          </p:nvPr>
+        </p:nvSpPr>
+        <p:spPr/>
+        <p:txBody>
+          <a:bodyPr/>
+          <a:lstStyle/>
+          <a:p>
+            <a:r>
+              <a:rPr lang="en-US" dirty="0"/>
+              <a:t>Decks: </a:t>
+            </a:r>
+            <a:r>
+              <a:rPr lang="en-US" dirty="0">
+                <a:hlinkClick r:id="rId2"/>
+              </a:rPr>
+              <a:t>https://github.com/jeffputz</a:t>
+            </a:r>
+            <a:endParaRPr lang="en-US" dirty="0"/>
+          </a:p>
+          <a:p>
+            <a:r>
+              <a:rPr lang="en-US" dirty="0">
+                <a:hlinkClick r:id="rId3"/>
+              </a:rPr>
+              <a:t>jeff@popw.com</a:t>
+            </a:r>
+            <a:r>
+              <a:rPr lang="en-US" dirty="0"/>
+              <a:t> and on the Twitter @</a:t>
+            </a:r>
+            <a:r>
+              <a:rPr lang="en-US" dirty="0" err="1"/>
+              <a:t>jeffputz</a:t>
+            </a:r>
+            <a:endParaRPr lang="en-US" dirty="0"/>
+          </a:p>
+          <a:p>
+            <a:endParaRPr lang="en-US" dirty="0"/>
+          </a:p>
+        </p:txBody>
+      </p:sp>
+    </p:spTree>
+    <p:extLst>
+      <p:ext uri="{BB962C8B-B14F-4D97-AF65-F5344CB8AC3E}">
+        <p14:creationId xmlns:p14="http://schemas.microsoft.com/office/powerpoint/2010/main" val="1613228745"/>
       </p:ext>
     </p:extLst>
   </p:cSld>
@@ -8806,7 +7295,7 @@
 </p:sld>
 </file>
 
-<file path=ppt/slides/slide8.xml><?xml version="1.0" encoding="utf-8"?>
+<file path=ppt/slides/slide2.xml><?xml version="1.0" encoding="utf-8"?>
 <p:sld xmlns:a="http://schemas.openxmlformats.org/drawingml/2006/main" xmlns:r="http://schemas.openxmlformats.org/officeDocument/2006/relationships" xmlns:p="http://schemas.openxmlformats.org/presentationml/2006/main">
   <p:cSld>
     <p:spTree>
@@ -8840,7 +7329,7 @@
           <a:p>
             <a:r>
               <a:rPr lang="en-US" dirty="0" smtClean="0"/>
-              <a:t>A quick reality check</a:t>
+              <a:t>About me</a:t>
             </a:r>
             <a:endParaRPr lang="en-US" dirty="0"/>
           </a:p>
@@ -8858,23 +7347,98 @@
         </p:nvSpPr>
         <p:spPr/>
         <p:txBody>
-          <a:bodyPr>
-            <a:normAutofit/>
-          </a:bodyPr>
+          <a:bodyPr/>
           <a:lstStyle/>
           <a:p>
             <a:r>
-              <a:rPr lang="en-US" sz="9600" dirty="0" smtClean="0"/>
-              <a:t>You are not Facebook or the Twitter.</a:t>
-            </a:r>
-            <a:endParaRPr lang="en-US" sz="9600" dirty="0"/>
+              <a:rPr lang="en-US" dirty="0" smtClean="0"/>
+              <a:t>Working the </a:t>
+            </a:r>
+            <a:r>
+              <a:rPr lang="en-US" dirty="0" err="1" smtClean="0"/>
+              <a:t>softwares</a:t>
+            </a:r>
+            <a:r>
+              <a:rPr lang="en-US" dirty="0" smtClean="0"/>
+              <a:t> since 1999-ish.</a:t>
+            </a:r>
+          </a:p>
+          <a:p>
+            <a:r>
+              <a:rPr lang="en-US" dirty="0" smtClean="0"/>
+              <a:t>Diverse experience, from </a:t>
+            </a:r>
+            <a:r>
+              <a:rPr lang="en-US" dirty="0" err="1" smtClean="0"/>
+              <a:t>megacorps</a:t>
+            </a:r>
+            <a:r>
+              <a:rPr lang="en-US" dirty="0" smtClean="0"/>
+              <a:t> like Microsoft and Humana to startups and dot-com flameouts.</a:t>
+            </a:r>
+          </a:p>
+          <a:p>
+            <a:r>
+              <a:rPr lang="en-US" dirty="0" smtClean="0"/>
+              <a:t>Currently VP of Product Development and Software Engineering for </a:t>
+            </a:r>
+            <a:r>
+              <a:rPr lang="en-US" dirty="0" err="1" smtClean="0"/>
+              <a:t>novi</a:t>
+            </a:r>
+            <a:r>
+              <a:rPr lang="en-US" dirty="0" smtClean="0"/>
+              <a:t> AMS.</a:t>
+            </a:r>
+          </a:p>
+          <a:p>
+            <a:r>
+              <a:rPr lang="en-US" dirty="0" smtClean="0"/>
+              <a:t>Been hiring people on and off for the last ten years.</a:t>
+            </a:r>
+          </a:p>
+          <a:p>
+            <a:r>
+              <a:rPr lang="en-US" dirty="0"/>
+              <a:t>Decks: </a:t>
+            </a:r>
+            <a:r>
+              <a:rPr lang="en-US" dirty="0">
+                <a:hlinkClick r:id="rId2"/>
+              </a:rPr>
+              <a:t>https://</a:t>
+            </a:r>
+            <a:r>
+              <a:rPr lang="en-US" dirty="0" smtClean="0">
+                <a:hlinkClick r:id="rId2"/>
+              </a:rPr>
+              <a:t>github.com/jeffputz</a:t>
+            </a:r>
+            <a:endParaRPr lang="en-US" dirty="0" smtClean="0"/>
+          </a:p>
+          <a:p>
+            <a:r>
+              <a:rPr lang="en-US" dirty="0" smtClean="0">
+                <a:hlinkClick r:id="rId3"/>
+              </a:rPr>
+              <a:t>jeff@popw.com</a:t>
+            </a:r>
+            <a:r>
+              <a:rPr lang="en-US" dirty="0" smtClean="0"/>
+              <a:t> and on the Twitter @</a:t>
+            </a:r>
+            <a:r>
+              <a:rPr lang="en-US" dirty="0" err="1" smtClean="0"/>
+              <a:t>jeffputz</a:t>
+            </a:r>
+            <a:endParaRPr lang="en-US" dirty="0"/>
           </a:p>
         </p:txBody>
       </p:sp>
     </p:spTree>
     <p:extLst>
       <p:ext uri="{BB962C8B-B14F-4D97-AF65-F5344CB8AC3E}">
-        <p14:creationId xmlns:p14="http://schemas.microsoft.com/office/powerpoint/2010/main" val="1194461399"/>
+        <p14:creationId xmlns:p14="http://schemas.microsoft.com/office/powerpoint/2010/main" val="181294471"/>
       </p:ext>
     </p:extLst>
   </p:cSld>
@@ -8891,7 +7455,7 @@
 </p:sld>
 </file>
 
-<file path=ppt/slides/slide9.xml><?xml version="1.0" encoding="utf-8"?>
+<file path=ppt/slides/slide3.xml><?xml version="1.0" encoding="utf-8"?>
 <p:sld xmlns:a="http://schemas.openxmlformats.org/drawingml/2006/main" xmlns:r="http://schemas.openxmlformats.org/officeDocument/2006/relationships" xmlns:p="http://schemas.openxmlformats.org/presentationml/2006/main">
   <p:cSld>
     <p:spTree>
@@ -8925,7 +7489,7 @@
           <a:p>
             <a:r>
               <a:rPr lang="en-US" dirty="0" smtClean="0"/>
-              <a:t>The new normal</a:t>
+              <a:t>Who is this for</a:t>
             </a:r>
             <a:endParaRPr lang="en-US" dirty="0"/>
           </a:p>
@@ -8943,46 +7507,56 @@
         </p:nvSpPr>
         <p:spPr/>
         <p:txBody>
-          <a:bodyPr>
-            <a:normAutofit lnSpcReduction="10000"/>
-          </a:bodyPr>
+          <a:bodyPr/>
           <a:lstStyle/>
           <a:p>
             <a:r>
               <a:rPr lang="en-US" dirty="0" smtClean="0"/>
-              <a:t>Most SQL databases can do straight, single-key storage adequately.</a:t>
+              <a:t>Developers, developers, developers</a:t>
             </a:r>
           </a:p>
           <a:p>
             <a:r>
               <a:rPr lang="en-US" dirty="0" smtClean="0"/>
-              <a:t>Fight the urge to normalize everything.</a:t>
+              <a:t>“Architects”</a:t>
             </a:r>
           </a:p>
           <a:p>
             <a:r>
               <a:rPr lang="en-US" dirty="0" smtClean="0"/>
-              <a:t>Sometimes, it’s OK to compose instead of join (an important consideration for NoSQL usage, but also for SQL).</a:t>
+              <a:t>Skeptical business folk</a:t>
             </a:r>
           </a:p>
           <a:p>
             <a:r>
               <a:rPr lang="en-US" dirty="0" smtClean="0"/>
-              <a:t>Important: Don’t build schema around object graphs that never have to be interrogated. Just serialize it, drop it in a single field.</a:t>
-            </a:r>
-          </a:p>
-          <a:p>
+              <a:t>This is not an argument </a:t>
+            </a:r>
             <a:r>
               <a:rPr lang="en-US" dirty="0" smtClean="0"/>
-              <a:t>Break down what your business need is, and figure out the fastest possible way to get it. Focus on the domain, not </a:t>
-            </a:r>
-            <a:r>
-              <a:rPr lang="en-US" smtClean="0"/>
-              <a:t>the persistence </a:t>
+              <a:t>about what is more </a:t>
+            </a:r>
+            <a:r>
+              <a:rPr lang="en-US" dirty="0" err="1" smtClean="0"/>
+              <a:t>scaleable</a:t>
             </a:r>
             <a:r>
               <a:rPr lang="en-US" dirty="0" smtClean="0"/>
-              <a:t>and code mechanisms.</a:t>
+              <a:t>, </a:t>
+            </a:r>
+            <a:r>
+              <a:rPr lang="en-US" dirty="0" smtClean="0"/>
+              <a:t>but rather choosing the right tool (scale is different for SQL vs. NoSQL</a:t>
+            </a:r>
+            <a:r>
+              <a:rPr lang="en-US" dirty="0" smtClean="0"/>
+              <a:t>)</a:t>
+            </a:r>
+          </a:p>
+          <a:p>
+            <a:r>
+              <a:rPr lang="en-US" dirty="0" smtClean="0"/>
+              <a:t>There are good practices to follow for any persistence platform</a:t>
             </a:r>
             <a:endParaRPr lang="en-US" dirty="0"/>
           </a:p>
@@ -8991,7 +7565,7 @@
     </p:spTree>
     <p:extLst>
       <p:ext uri="{BB962C8B-B14F-4D97-AF65-F5344CB8AC3E}">
-        <p14:creationId xmlns:p14="http://schemas.microsoft.com/office/powerpoint/2010/main" val="1753287024"/>
+        <p14:creationId xmlns:p14="http://schemas.microsoft.com/office/powerpoint/2010/main" val="1478897902"/>
       </p:ext>
     </p:extLst>
   </p:cSld>
@@ -9339,6 +7913,1812 @@
 </p:sld>
 </file>
 
+<file path=ppt/slides/slide4.xml><?xml version="1.0" encoding="utf-8"?>
+<p:sld xmlns:a="http://schemas.openxmlformats.org/drawingml/2006/main" xmlns:r="http://schemas.openxmlformats.org/officeDocument/2006/relationships" xmlns:p="http://schemas.openxmlformats.org/presentationml/2006/main">
+  <p:cSld>
+    <p:spTree>
+      <p:nvGrpSpPr>
+        <p:cNvPr id="1" name=""/>
+        <p:cNvGrpSpPr/>
+        <p:nvPr/>
+      </p:nvGrpSpPr>
+      <p:grpSpPr>
+        <a:xfrm>
+          <a:off x="0" y="0"/>
+          <a:ext cx="0" cy="0"/>
+          <a:chOff x="0" y="0"/>
+          <a:chExt cx="0" cy="0"/>
+        </a:xfrm>
+      </p:grpSpPr>
+      <p:sp>
+        <p:nvSpPr>
+          <p:cNvPr id="4" name="TextBox 3"/>
+          <p:cNvSpPr txBox="1"/>
+          <p:nvPr/>
+        </p:nvSpPr>
+        <p:spPr>
+          <a:xfrm>
+            <a:off x="3690851" y="0"/>
+            <a:ext cx="4522123" cy="1569660"/>
+          </a:xfrm>
+          <a:prstGeom prst="rect">
+            <a:avLst/>
+          </a:prstGeom>
+          <a:noFill/>
+        </p:spPr>
+        <p:txBody>
+          <a:bodyPr wrap="square" rtlCol="0">
+            <a:spAutoFit/>
+          </a:bodyPr>
+          <a:lstStyle/>
+          <a:p>
+            <a:pPr algn="ctr"/>
+            <a:r>
+              <a:rPr lang="en-US" sz="9600" dirty="0" smtClean="0"/>
+              <a:t>2010</a:t>
+            </a:r>
+            <a:endParaRPr lang="en-US" sz="9600" dirty="0"/>
+          </a:p>
+        </p:txBody>
+      </p:sp>
+      <p:pic>
+        <p:nvPicPr>
+          <p:cNvPr id="5" name="Picture 4"/>
+          <p:cNvPicPr>
+            <a:picLocks noChangeAspect="1"/>
+          </p:cNvPicPr>
+          <p:nvPr/>
+        </p:nvPicPr>
+        <p:blipFill>
+          <a:blip r:embed="rId2">
+            <a:extLst>
+              <a:ext uri="{28A0092B-C50C-407E-A947-70E740481C1C}">
+                <a14:useLocalDpi xmlns:a14="http://schemas.microsoft.com/office/drawing/2010/main" val="0"/>
+              </a:ext>
+            </a:extLst>
+          </a:blip>
+          <a:stretch>
+            <a:fillRect/>
+          </a:stretch>
+        </p:blipFill>
+        <p:spPr>
+          <a:xfrm>
+            <a:off x="2431036" y="1401157"/>
+            <a:ext cx="7041752" cy="4999644"/>
+          </a:xfrm>
+          <a:prstGeom prst="rect">
+            <a:avLst/>
+          </a:prstGeom>
+        </p:spPr>
+      </p:pic>
+    </p:spTree>
+    <p:extLst>
+      <p:ext uri="{BB962C8B-B14F-4D97-AF65-F5344CB8AC3E}">
+        <p14:creationId xmlns:p14="http://schemas.microsoft.com/office/powerpoint/2010/main" val="1562678716"/>
+      </p:ext>
+    </p:extLst>
+  </p:cSld>
+  <p:clrMapOvr>
+    <a:masterClrMapping/>
+  </p:clrMapOvr>
+  <p:timing>
+    <p:tnLst>
+      <p:par>
+        <p:cTn id="1" dur="indefinite" restart="never" nodeType="tmRoot"/>
+      </p:par>
+    </p:tnLst>
+  </p:timing>
+</p:sld>
+</file>
+
+<file path=ppt/slides/slide5.xml><?xml version="1.0" encoding="utf-8"?>
+<p:sld xmlns:a="http://schemas.openxmlformats.org/drawingml/2006/main" xmlns:r="http://schemas.openxmlformats.org/officeDocument/2006/relationships" xmlns:p="http://schemas.openxmlformats.org/presentationml/2006/main">
+  <p:cSld>
+    <p:spTree>
+      <p:nvGrpSpPr>
+        <p:cNvPr id="1" name=""/>
+        <p:cNvGrpSpPr/>
+        <p:nvPr/>
+      </p:nvGrpSpPr>
+      <p:grpSpPr>
+        <a:xfrm>
+          <a:off x="0" y="0"/>
+          <a:ext cx="0" cy="0"/>
+          <a:chOff x="0" y="0"/>
+          <a:chExt cx="0" cy="0"/>
+        </a:xfrm>
+      </p:grpSpPr>
+      <p:sp>
+        <p:nvSpPr>
+          <p:cNvPr id="2" name="Title 1"/>
+          <p:cNvSpPr>
+            <a:spLocks noGrp="1"/>
+          </p:cNvSpPr>
+          <p:nvPr>
+            <p:ph type="title"/>
+          </p:nvPr>
+        </p:nvSpPr>
+        <p:spPr/>
+        <p:txBody>
+          <a:bodyPr/>
+          <a:lstStyle/>
+          <a:p>
+            <a:r>
+              <a:rPr lang="en-US" dirty="0" smtClean="0"/>
+              <a:t>To SQL or not to SQL</a:t>
+            </a:r>
+            <a:endParaRPr lang="en-US" dirty="0"/>
+          </a:p>
+        </p:txBody>
+      </p:sp>
+      <p:sp>
+        <p:nvSpPr>
+          <p:cNvPr id="3" name="Content Placeholder 2"/>
+          <p:cNvSpPr>
+            <a:spLocks noGrp="1"/>
+          </p:cNvSpPr>
+          <p:nvPr>
+            <p:ph idx="1"/>
+          </p:nvPr>
+        </p:nvSpPr>
+        <p:spPr/>
+        <p:txBody>
+          <a:bodyPr/>
+          <a:lstStyle/>
+          <a:p>
+            <a:r>
+              <a:rPr lang="en-US" dirty="0" smtClean="0"/>
+              <a:t>Does your data have relationships? Parent/child relationships are the biggest reason for this. Use SQL.</a:t>
+            </a:r>
+          </a:p>
+          <a:p>
+            <a:r>
+              <a:rPr lang="en-US" dirty="0" smtClean="0"/>
+              <a:t>Have unstructured data, data retrieved by a single key, documents, blobs? Use </a:t>
+            </a:r>
+            <a:r>
+              <a:rPr lang="en-US" dirty="0" smtClean="0"/>
+              <a:t>NoSQL</a:t>
+            </a:r>
+            <a:r>
+              <a:rPr lang="en-US" dirty="0" smtClean="0"/>
+              <a:t>.</a:t>
+            </a:r>
+            <a:endParaRPr lang="en-US" dirty="0" smtClean="0"/>
+          </a:p>
+          <a:p>
+            <a:r>
+              <a:rPr lang="en-US" dirty="0" smtClean="0"/>
+              <a:t>Does your schema change a lot, is querying reasonably specific and are do you have specific throughput targets? NoSQL, but get ready to research your options.</a:t>
+            </a:r>
+          </a:p>
+          <a:p>
+            <a:r>
+              <a:rPr lang="en-US" dirty="0" smtClean="0"/>
+              <a:t>What experience does your team have? SQL is cheaper to support because everyone knows it. Also: SQL can probably do what you need.</a:t>
+            </a:r>
+          </a:p>
+          <a:p>
+            <a:endParaRPr lang="en-US" dirty="0"/>
+          </a:p>
+        </p:txBody>
+      </p:sp>
+    </p:spTree>
+    <p:extLst>
+      <p:ext uri="{BB962C8B-B14F-4D97-AF65-F5344CB8AC3E}">
+        <p14:creationId xmlns:p14="http://schemas.microsoft.com/office/powerpoint/2010/main" val="1742395677"/>
+      </p:ext>
+    </p:extLst>
+  </p:cSld>
+  <p:clrMapOvr>
+    <a:masterClrMapping/>
+  </p:clrMapOvr>
+  <p:timing>
+    <p:tnLst>
+      <p:par>
+        <p:cTn id="1" dur="indefinite" restart="never" nodeType="tmRoot">
+          <p:childTnLst>
+            <p:seq concurrent="1" nextAc="seek">
+              <p:cTn id="2" dur="indefinite" nodeType="mainSeq">
+                <p:childTnLst>
+                  <p:par>
+                    <p:cTn id="3" fill="hold">
+                      <p:stCondLst>
+                        <p:cond delay="indefinite"/>
+                      </p:stCondLst>
+                      <p:childTnLst>
+                        <p:par>
+                          <p:cTn id="4" fill="hold">
+                            <p:stCondLst>
+                              <p:cond delay="0"/>
+                            </p:stCondLst>
+                            <p:childTnLst>
+                              <p:par>
+                                <p:cTn id="5" presetID="10" presetClass="entr" presetSubtype="0" fill="hold" grpId="0" nodeType="clickEffect">
+                                  <p:stCondLst>
+                                    <p:cond delay="0"/>
+                                  </p:stCondLst>
+                                  <p:childTnLst>
+                                    <p:set>
+                                      <p:cBhvr>
+                                        <p:cTn id="6" dur="1" fill="hold">
+                                          <p:stCondLst>
+                                            <p:cond delay="0"/>
+                                          </p:stCondLst>
+                                        </p:cTn>
+                                        <p:tgtEl>
+                                          <p:spTgt spid="3">
+                                            <p:txEl>
+                                              <p:pRg st="0" end="0"/>
+                                            </p:txEl>
+                                          </p:spTgt>
+                                        </p:tgtEl>
+                                        <p:attrNameLst>
+                                          <p:attrName>style.visibility</p:attrName>
+                                        </p:attrNameLst>
+                                      </p:cBhvr>
+                                      <p:to>
+                                        <p:strVal val="visible"/>
+                                      </p:to>
+                                    </p:set>
+                                    <p:animEffect transition="in" filter="fade">
+                                      <p:cBhvr>
+                                        <p:cTn id="7" dur="500"/>
+                                        <p:tgtEl>
+                                          <p:spTgt spid="3">
+                                            <p:txEl>
+                                              <p:pRg st="0" end="0"/>
+                                            </p:txEl>
+                                          </p:spTgt>
+                                        </p:tgtEl>
+                                      </p:cBhvr>
+                                    </p:animEffect>
+                                  </p:childTnLst>
+                                </p:cTn>
+                              </p:par>
+                            </p:childTnLst>
+                          </p:cTn>
+                        </p:par>
+                      </p:childTnLst>
+                    </p:cTn>
+                  </p:par>
+                  <p:par>
+                    <p:cTn id="8" fill="hold">
+                      <p:stCondLst>
+                        <p:cond delay="indefinite"/>
+                      </p:stCondLst>
+                      <p:childTnLst>
+                        <p:par>
+                          <p:cTn id="9" fill="hold">
+                            <p:stCondLst>
+                              <p:cond delay="0"/>
+                            </p:stCondLst>
+                            <p:childTnLst>
+                              <p:par>
+                                <p:cTn id="10" presetID="10" presetClass="entr" presetSubtype="0" fill="hold" grpId="0" nodeType="clickEffect">
+                                  <p:stCondLst>
+                                    <p:cond delay="0"/>
+                                  </p:stCondLst>
+                                  <p:childTnLst>
+                                    <p:set>
+                                      <p:cBhvr>
+                                        <p:cTn id="11" dur="1" fill="hold">
+                                          <p:stCondLst>
+                                            <p:cond delay="0"/>
+                                          </p:stCondLst>
+                                        </p:cTn>
+                                        <p:tgtEl>
+                                          <p:spTgt spid="3">
+                                            <p:txEl>
+                                              <p:pRg st="1" end="1"/>
+                                            </p:txEl>
+                                          </p:spTgt>
+                                        </p:tgtEl>
+                                        <p:attrNameLst>
+                                          <p:attrName>style.visibility</p:attrName>
+                                        </p:attrNameLst>
+                                      </p:cBhvr>
+                                      <p:to>
+                                        <p:strVal val="visible"/>
+                                      </p:to>
+                                    </p:set>
+                                    <p:animEffect transition="in" filter="fade">
+                                      <p:cBhvr>
+                                        <p:cTn id="12" dur="500"/>
+                                        <p:tgtEl>
+                                          <p:spTgt spid="3">
+                                            <p:txEl>
+                                              <p:pRg st="1" end="1"/>
+                                            </p:txEl>
+                                          </p:spTgt>
+                                        </p:tgtEl>
+                                      </p:cBhvr>
+                                    </p:animEffect>
+                                  </p:childTnLst>
+                                </p:cTn>
+                              </p:par>
+                            </p:childTnLst>
+                          </p:cTn>
+                        </p:par>
+                      </p:childTnLst>
+                    </p:cTn>
+                  </p:par>
+                  <p:par>
+                    <p:cTn id="13" fill="hold">
+                      <p:stCondLst>
+                        <p:cond delay="indefinite"/>
+                      </p:stCondLst>
+                      <p:childTnLst>
+                        <p:par>
+                          <p:cTn id="14" fill="hold">
+                            <p:stCondLst>
+                              <p:cond delay="0"/>
+                            </p:stCondLst>
+                            <p:childTnLst>
+                              <p:par>
+                                <p:cTn id="15" presetID="10" presetClass="entr" presetSubtype="0" fill="hold" grpId="0" nodeType="clickEffect">
+                                  <p:stCondLst>
+                                    <p:cond delay="0"/>
+                                  </p:stCondLst>
+                                  <p:childTnLst>
+                                    <p:set>
+                                      <p:cBhvr>
+                                        <p:cTn id="16" dur="1" fill="hold">
+                                          <p:stCondLst>
+                                            <p:cond delay="0"/>
+                                          </p:stCondLst>
+                                        </p:cTn>
+                                        <p:tgtEl>
+                                          <p:spTgt spid="3">
+                                            <p:txEl>
+                                              <p:pRg st="2" end="2"/>
+                                            </p:txEl>
+                                          </p:spTgt>
+                                        </p:tgtEl>
+                                        <p:attrNameLst>
+                                          <p:attrName>style.visibility</p:attrName>
+                                        </p:attrNameLst>
+                                      </p:cBhvr>
+                                      <p:to>
+                                        <p:strVal val="visible"/>
+                                      </p:to>
+                                    </p:set>
+                                    <p:animEffect transition="in" filter="fade">
+                                      <p:cBhvr>
+                                        <p:cTn id="17" dur="500"/>
+                                        <p:tgtEl>
+                                          <p:spTgt spid="3">
+                                            <p:txEl>
+                                              <p:pRg st="2" end="2"/>
+                                            </p:txEl>
+                                          </p:spTgt>
+                                        </p:tgtEl>
+                                      </p:cBhvr>
+                                    </p:animEffect>
+                                  </p:childTnLst>
+                                </p:cTn>
+                              </p:par>
+                            </p:childTnLst>
+                          </p:cTn>
+                        </p:par>
+                      </p:childTnLst>
+                    </p:cTn>
+                  </p:par>
+                  <p:par>
+                    <p:cTn id="18" fill="hold">
+                      <p:stCondLst>
+                        <p:cond delay="indefinite"/>
+                      </p:stCondLst>
+                      <p:childTnLst>
+                        <p:par>
+                          <p:cTn id="19" fill="hold">
+                            <p:stCondLst>
+                              <p:cond delay="0"/>
+                            </p:stCondLst>
+                            <p:childTnLst>
+                              <p:par>
+                                <p:cTn id="20" presetID="10" presetClass="entr" presetSubtype="0" fill="hold" grpId="0" nodeType="clickEffect">
+                                  <p:stCondLst>
+                                    <p:cond delay="0"/>
+                                  </p:stCondLst>
+                                  <p:childTnLst>
+                                    <p:set>
+                                      <p:cBhvr>
+                                        <p:cTn id="21" dur="1" fill="hold">
+                                          <p:stCondLst>
+                                            <p:cond delay="0"/>
+                                          </p:stCondLst>
+                                        </p:cTn>
+                                        <p:tgtEl>
+                                          <p:spTgt spid="3">
+                                            <p:txEl>
+                                              <p:pRg st="3" end="3"/>
+                                            </p:txEl>
+                                          </p:spTgt>
+                                        </p:tgtEl>
+                                        <p:attrNameLst>
+                                          <p:attrName>style.visibility</p:attrName>
+                                        </p:attrNameLst>
+                                      </p:cBhvr>
+                                      <p:to>
+                                        <p:strVal val="visible"/>
+                                      </p:to>
+                                    </p:set>
+                                    <p:animEffect transition="in" filter="fade">
+                                      <p:cBhvr>
+                                        <p:cTn id="22" dur="500"/>
+                                        <p:tgtEl>
+                                          <p:spTgt spid="3">
+                                            <p:txEl>
+                                              <p:pRg st="3" end="3"/>
+                                            </p:txEl>
+                                          </p:spTgt>
+                                        </p:tgtEl>
+                                      </p:cBhvr>
+                                    </p:animEffect>
+                                  </p:childTnLst>
+                                </p:cTn>
+                              </p:par>
+                            </p:childTnLst>
+                          </p:cTn>
+                        </p:par>
+                      </p:childTnLst>
+                    </p:cTn>
+                  </p:par>
+                </p:childTnLst>
+              </p:cTn>
+              <p:prevCondLst>
+                <p:cond evt="onPrev" delay="0">
+                  <p:tgtEl>
+                    <p:sldTgt/>
+                  </p:tgtEl>
+                </p:cond>
+              </p:prevCondLst>
+              <p:nextCondLst>
+                <p:cond evt="onNext" delay="0">
+                  <p:tgtEl>
+                    <p:sldTgt/>
+                  </p:tgtEl>
+                </p:cond>
+              </p:nextCondLst>
+            </p:seq>
+          </p:childTnLst>
+        </p:cTn>
+      </p:par>
+    </p:tnLst>
+    <p:bldLst>
+      <p:bldP spid="3" grpId="0" build="p"/>
+    </p:bldLst>
+  </p:timing>
+</p:sld>
+</file>
+
+<file path=ppt/slides/slide6.xml><?xml version="1.0" encoding="utf-8"?>
+<p:sld xmlns:a="http://schemas.openxmlformats.org/drawingml/2006/main" xmlns:r="http://schemas.openxmlformats.org/officeDocument/2006/relationships" xmlns:p="http://schemas.openxmlformats.org/presentationml/2006/main">
+  <p:cSld>
+    <p:spTree>
+      <p:nvGrpSpPr>
+        <p:cNvPr id="1" name=""/>
+        <p:cNvGrpSpPr/>
+        <p:nvPr/>
+      </p:nvGrpSpPr>
+      <p:grpSpPr>
+        <a:xfrm>
+          <a:off x="0" y="0"/>
+          <a:ext cx="0" cy="0"/>
+          <a:chOff x="0" y="0"/>
+          <a:chExt cx="0" cy="0"/>
+        </a:xfrm>
+      </p:grpSpPr>
+      <p:sp>
+        <p:nvSpPr>
+          <p:cNvPr id="2" name="Title 1"/>
+          <p:cNvSpPr>
+            <a:spLocks noGrp="1"/>
+          </p:cNvSpPr>
+          <p:nvPr>
+            <p:ph type="title"/>
+          </p:nvPr>
+        </p:nvSpPr>
+        <p:spPr/>
+        <p:txBody>
+          <a:bodyPr/>
+          <a:lstStyle/>
+          <a:p>
+            <a:r>
+              <a:rPr lang="en-US" dirty="0" smtClean="0"/>
+              <a:t>What problems does NoSQL solve?</a:t>
+            </a:r>
+            <a:endParaRPr lang="en-US" dirty="0"/>
+          </a:p>
+        </p:txBody>
+      </p:sp>
+      <p:sp>
+        <p:nvSpPr>
+          <p:cNvPr id="3" name="Content Placeholder 2"/>
+          <p:cNvSpPr>
+            <a:spLocks noGrp="1"/>
+          </p:cNvSpPr>
+          <p:nvPr>
+            <p:ph idx="1"/>
+          </p:nvPr>
+        </p:nvSpPr>
+        <p:spPr/>
+        <p:txBody>
+          <a:bodyPr>
+            <a:normAutofit fontScale="92500" lnSpcReduction="10000"/>
+          </a:bodyPr>
+          <a:lstStyle/>
+          <a:p>
+            <a:r>
+              <a:rPr lang="en-US" dirty="0" smtClean="0"/>
+              <a:t>Computationally less expensive, depending on which system.</a:t>
+            </a:r>
+          </a:p>
+          <a:p>
+            <a:r>
+              <a:rPr lang="en-US" dirty="0" smtClean="0"/>
+              <a:t>Crazy throughput, especially for writes, also depending on system</a:t>
+            </a:r>
+            <a:r>
+              <a:rPr lang="en-US" dirty="0" smtClean="0"/>
+              <a:t>.</a:t>
+            </a:r>
+          </a:p>
+          <a:p>
+            <a:r>
+              <a:rPr lang="en-US" dirty="0" smtClean="0"/>
+              <a:t>Potentially higher developer productivity (assuming prior knowledge and the kinds of change in the app lifecycle).</a:t>
+            </a:r>
+            <a:endParaRPr lang="en-US" dirty="0" smtClean="0"/>
+          </a:p>
+          <a:p>
+            <a:r>
+              <a:rPr lang="en-US" dirty="0" smtClean="0"/>
+              <a:t>Tons of options, many in managed cloud offerings</a:t>
+            </a:r>
+            <a:r>
+              <a:rPr lang="en-US" dirty="0" smtClean="0"/>
+              <a:t>. Choose from key/value, document, graph, column.</a:t>
+            </a:r>
+            <a:endParaRPr lang="en-US" dirty="0" smtClean="0"/>
+          </a:p>
+          <a:p>
+            <a:r>
+              <a:rPr lang="en-US" dirty="0" smtClean="0"/>
+              <a:t>Many are open source, so licensing is not a component of cost.</a:t>
+            </a:r>
+          </a:p>
+          <a:p>
+            <a:r>
+              <a:rPr lang="en-US" dirty="0" smtClean="0"/>
+              <a:t>Simple API’s, usually RESTful, so they’re platform agnostic (though let’s be honest, you can use SQL variants everywhere too).</a:t>
+            </a:r>
+          </a:p>
+          <a:p>
+            <a:r>
+              <a:rPr lang="en-US" dirty="0" smtClean="0"/>
+              <a:t>Ironically, using </a:t>
+            </a:r>
+            <a:r>
+              <a:rPr lang="en-US" dirty="0" smtClean="0"/>
+              <a:t>NoSQL and thinking in the simplest terms is good practice for better SQL.</a:t>
+            </a:r>
+            <a:endParaRPr lang="en-US" dirty="0"/>
+          </a:p>
+        </p:txBody>
+      </p:sp>
+    </p:spTree>
+    <p:extLst>
+      <p:ext uri="{BB962C8B-B14F-4D97-AF65-F5344CB8AC3E}">
+        <p14:creationId xmlns:p14="http://schemas.microsoft.com/office/powerpoint/2010/main" val="1342712560"/>
+      </p:ext>
+    </p:extLst>
+  </p:cSld>
+  <p:clrMapOvr>
+    <a:masterClrMapping/>
+  </p:clrMapOvr>
+  <p:timing>
+    <p:tnLst>
+      <p:par>
+        <p:cTn id="1" dur="indefinite" restart="never" nodeType="tmRoot">
+          <p:childTnLst>
+            <p:seq concurrent="1" nextAc="seek">
+              <p:cTn id="2" dur="indefinite" nodeType="mainSeq">
+                <p:childTnLst>
+                  <p:par>
+                    <p:cTn id="3" fill="hold">
+                      <p:stCondLst>
+                        <p:cond delay="indefinite"/>
+                      </p:stCondLst>
+                      <p:childTnLst>
+                        <p:par>
+                          <p:cTn id="4" fill="hold">
+                            <p:stCondLst>
+                              <p:cond delay="0"/>
+                            </p:stCondLst>
+                            <p:childTnLst>
+                              <p:par>
+                                <p:cTn id="5" presetID="10" presetClass="entr" presetSubtype="0" fill="hold" grpId="0" nodeType="clickEffect">
+                                  <p:stCondLst>
+                                    <p:cond delay="0"/>
+                                  </p:stCondLst>
+                                  <p:childTnLst>
+                                    <p:set>
+                                      <p:cBhvr>
+                                        <p:cTn id="6" dur="1" fill="hold">
+                                          <p:stCondLst>
+                                            <p:cond delay="0"/>
+                                          </p:stCondLst>
+                                        </p:cTn>
+                                        <p:tgtEl>
+                                          <p:spTgt spid="3">
+                                            <p:txEl>
+                                              <p:pRg st="0" end="0"/>
+                                            </p:txEl>
+                                          </p:spTgt>
+                                        </p:tgtEl>
+                                        <p:attrNameLst>
+                                          <p:attrName>style.visibility</p:attrName>
+                                        </p:attrNameLst>
+                                      </p:cBhvr>
+                                      <p:to>
+                                        <p:strVal val="visible"/>
+                                      </p:to>
+                                    </p:set>
+                                    <p:animEffect transition="in" filter="fade">
+                                      <p:cBhvr>
+                                        <p:cTn id="7" dur="500"/>
+                                        <p:tgtEl>
+                                          <p:spTgt spid="3">
+                                            <p:txEl>
+                                              <p:pRg st="0" end="0"/>
+                                            </p:txEl>
+                                          </p:spTgt>
+                                        </p:tgtEl>
+                                      </p:cBhvr>
+                                    </p:animEffect>
+                                  </p:childTnLst>
+                                </p:cTn>
+                              </p:par>
+                            </p:childTnLst>
+                          </p:cTn>
+                        </p:par>
+                      </p:childTnLst>
+                    </p:cTn>
+                  </p:par>
+                  <p:par>
+                    <p:cTn id="8" fill="hold">
+                      <p:stCondLst>
+                        <p:cond delay="indefinite"/>
+                      </p:stCondLst>
+                      <p:childTnLst>
+                        <p:par>
+                          <p:cTn id="9" fill="hold">
+                            <p:stCondLst>
+                              <p:cond delay="0"/>
+                            </p:stCondLst>
+                            <p:childTnLst>
+                              <p:par>
+                                <p:cTn id="10" presetID="10" presetClass="entr" presetSubtype="0" fill="hold" grpId="0" nodeType="clickEffect">
+                                  <p:stCondLst>
+                                    <p:cond delay="0"/>
+                                  </p:stCondLst>
+                                  <p:childTnLst>
+                                    <p:set>
+                                      <p:cBhvr>
+                                        <p:cTn id="11" dur="1" fill="hold">
+                                          <p:stCondLst>
+                                            <p:cond delay="0"/>
+                                          </p:stCondLst>
+                                        </p:cTn>
+                                        <p:tgtEl>
+                                          <p:spTgt spid="3">
+                                            <p:txEl>
+                                              <p:pRg st="1" end="1"/>
+                                            </p:txEl>
+                                          </p:spTgt>
+                                        </p:tgtEl>
+                                        <p:attrNameLst>
+                                          <p:attrName>style.visibility</p:attrName>
+                                        </p:attrNameLst>
+                                      </p:cBhvr>
+                                      <p:to>
+                                        <p:strVal val="visible"/>
+                                      </p:to>
+                                    </p:set>
+                                    <p:animEffect transition="in" filter="fade">
+                                      <p:cBhvr>
+                                        <p:cTn id="12" dur="500"/>
+                                        <p:tgtEl>
+                                          <p:spTgt spid="3">
+                                            <p:txEl>
+                                              <p:pRg st="1" end="1"/>
+                                            </p:txEl>
+                                          </p:spTgt>
+                                        </p:tgtEl>
+                                      </p:cBhvr>
+                                    </p:animEffect>
+                                  </p:childTnLst>
+                                </p:cTn>
+                              </p:par>
+                            </p:childTnLst>
+                          </p:cTn>
+                        </p:par>
+                      </p:childTnLst>
+                    </p:cTn>
+                  </p:par>
+                  <p:par>
+                    <p:cTn id="13" fill="hold">
+                      <p:stCondLst>
+                        <p:cond delay="indefinite"/>
+                      </p:stCondLst>
+                      <p:childTnLst>
+                        <p:par>
+                          <p:cTn id="14" fill="hold">
+                            <p:stCondLst>
+                              <p:cond delay="0"/>
+                            </p:stCondLst>
+                            <p:childTnLst>
+                              <p:par>
+                                <p:cTn id="15" presetID="10" presetClass="entr" presetSubtype="0" fill="hold" grpId="0" nodeType="clickEffect">
+                                  <p:stCondLst>
+                                    <p:cond delay="0"/>
+                                  </p:stCondLst>
+                                  <p:childTnLst>
+                                    <p:set>
+                                      <p:cBhvr>
+                                        <p:cTn id="16" dur="1" fill="hold">
+                                          <p:stCondLst>
+                                            <p:cond delay="0"/>
+                                          </p:stCondLst>
+                                        </p:cTn>
+                                        <p:tgtEl>
+                                          <p:spTgt spid="3">
+                                            <p:txEl>
+                                              <p:pRg st="2" end="2"/>
+                                            </p:txEl>
+                                          </p:spTgt>
+                                        </p:tgtEl>
+                                        <p:attrNameLst>
+                                          <p:attrName>style.visibility</p:attrName>
+                                        </p:attrNameLst>
+                                      </p:cBhvr>
+                                      <p:to>
+                                        <p:strVal val="visible"/>
+                                      </p:to>
+                                    </p:set>
+                                    <p:animEffect transition="in" filter="fade">
+                                      <p:cBhvr>
+                                        <p:cTn id="17" dur="500"/>
+                                        <p:tgtEl>
+                                          <p:spTgt spid="3">
+                                            <p:txEl>
+                                              <p:pRg st="2" end="2"/>
+                                            </p:txEl>
+                                          </p:spTgt>
+                                        </p:tgtEl>
+                                      </p:cBhvr>
+                                    </p:animEffect>
+                                  </p:childTnLst>
+                                </p:cTn>
+                              </p:par>
+                            </p:childTnLst>
+                          </p:cTn>
+                        </p:par>
+                      </p:childTnLst>
+                    </p:cTn>
+                  </p:par>
+                  <p:par>
+                    <p:cTn id="18" fill="hold">
+                      <p:stCondLst>
+                        <p:cond delay="indefinite"/>
+                      </p:stCondLst>
+                      <p:childTnLst>
+                        <p:par>
+                          <p:cTn id="19" fill="hold">
+                            <p:stCondLst>
+                              <p:cond delay="0"/>
+                            </p:stCondLst>
+                            <p:childTnLst>
+                              <p:par>
+                                <p:cTn id="20" presetID="10" presetClass="entr" presetSubtype="0" fill="hold" grpId="0" nodeType="clickEffect">
+                                  <p:stCondLst>
+                                    <p:cond delay="0"/>
+                                  </p:stCondLst>
+                                  <p:childTnLst>
+                                    <p:set>
+                                      <p:cBhvr>
+                                        <p:cTn id="21" dur="1" fill="hold">
+                                          <p:stCondLst>
+                                            <p:cond delay="0"/>
+                                          </p:stCondLst>
+                                        </p:cTn>
+                                        <p:tgtEl>
+                                          <p:spTgt spid="3">
+                                            <p:txEl>
+                                              <p:pRg st="3" end="3"/>
+                                            </p:txEl>
+                                          </p:spTgt>
+                                        </p:tgtEl>
+                                        <p:attrNameLst>
+                                          <p:attrName>style.visibility</p:attrName>
+                                        </p:attrNameLst>
+                                      </p:cBhvr>
+                                      <p:to>
+                                        <p:strVal val="visible"/>
+                                      </p:to>
+                                    </p:set>
+                                    <p:animEffect transition="in" filter="fade">
+                                      <p:cBhvr>
+                                        <p:cTn id="22" dur="500"/>
+                                        <p:tgtEl>
+                                          <p:spTgt spid="3">
+                                            <p:txEl>
+                                              <p:pRg st="3" end="3"/>
+                                            </p:txEl>
+                                          </p:spTgt>
+                                        </p:tgtEl>
+                                      </p:cBhvr>
+                                    </p:animEffect>
+                                  </p:childTnLst>
+                                </p:cTn>
+                              </p:par>
+                            </p:childTnLst>
+                          </p:cTn>
+                        </p:par>
+                      </p:childTnLst>
+                    </p:cTn>
+                  </p:par>
+                  <p:par>
+                    <p:cTn id="23" fill="hold">
+                      <p:stCondLst>
+                        <p:cond delay="indefinite"/>
+                      </p:stCondLst>
+                      <p:childTnLst>
+                        <p:par>
+                          <p:cTn id="24" fill="hold">
+                            <p:stCondLst>
+                              <p:cond delay="0"/>
+                            </p:stCondLst>
+                            <p:childTnLst>
+                              <p:par>
+                                <p:cTn id="25" presetID="10" presetClass="entr" presetSubtype="0" fill="hold" grpId="0" nodeType="clickEffect">
+                                  <p:stCondLst>
+                                    <p:cond delay="0"/>
+                                  </p:stCondLst>
+                                  <p:childTnLst>
+                                    <p:set>
+                                      <p:cBhvr>
+                                        <p:cTn id="26" dur="1" fill="hold">
+                                          <p:stCondLst>
+                                            <p:cond delay="0"/>
+                                          </p:stCondLst>
+                                        </p:cTn>
+                                        <p:tgtEl>
+                                          <p:spTgt spid="3">
+                                            <p:txEl>
+                                              <p:pRg st="4" end="4"/>
+                                            </p:txEl>
+                                          </p:spTgt>
+                                        </p:tgtEl>
+                                        <p:attrNameLst>
+                                          <p:attrName>style.visibility</p:attrName>
+                                        </p:attrNameLst>
+                                      </p:cBhvr>
+                                      <p:to>
+                                        <p:strVal val="visible"/>
+                                      </p:to>
+                                    </p:set>
+                                    <p:animEffect transition="in" filter="fade">
+                                      <p:cBhvr>
+                                        <p:cTn id="27" dur="500"/>
+                                        <p:tgtEl>
+                                          <p:spTgt spid="3">
+                                            <p:txEl>
+                                              <p:pRg st="4" end="4"/>
+                                            </p:txEl>
+                                          </p:spTgt>
+                                        </p:tgtEl>
+                                      </p:cBhvr>
+                                    </p:animEffect>
+                                  </p:childTnLst>
+                                </p:cTn>
+                              </p:par>
+                            </p:childTnLst>
+                          </p:cTn>
+                        </p:par>
+                      </p:childTnLst>
+                    </p:cTn>
+                  </p:par>
+                  <p:par>
+                    <p:cTn id="28" fill="hold">
+                      <p:stCondLst>
+                        <p:cond delay="indefinite"/>
+                      </p:stCondLst>
+                      <p:childTnLst>
+                        <p:par>
+                          <p:cTn id="29" fill="hold">
+                            <p:stCondLst>
+                              <p:cond delay="0"/>
+                            </p:stCondLst>
+                            <p:childTnLst>
+                              <p:par>
+                                <p:cTn id="30" presetID="10" presetClass="entr" presetSubtype="0" fill="hold" grpId="0" nodeType="clickEffect">
+                                  <p:stCondLst>
+                                    <p:cond delay="0"/>
+                                  </p:stCondLst>
+                                  <p:childTnLst>
+                                    <p:set>
+                                      <p:cBhvr>
+                                        <p:cTn id="31" dur="1" fill="hold">
+                                          <p:stCondLst>
+                                            <p:cond delay="0"/>
+                                          </p:stCondLst>
+                                        </p:cTn>
+                                        <p:tgtEl>
+                                          <p:spTgt spid="3">
+                                            <p:txEl>
+                                              <p:pRg st="5" end="5"/>
+                                            </p:txEl>
+                                          </p:spTgt>
+                                        </p:tgtEl>
+                                        <p:attrNameLst>
+                                          <p:attrName>style.visibility</p:attrName>
+                                        </p:attrNameLst>
+                                      </p:cBhvr>
+                                      <p:to>
+                                        <p:strVal val="visible"/>
+                                      </p:to>
+                                    </p:set>
+                                    <p:animEffect transition="in" filter="fade">
+                                      <p:cBhvr>
+                                        <p:cTn id="32" dur="500"/>
+                                        <p:tgtEl>
+                                          <p:spTgt spid="3">
+                                            <p:txEl>
+                                              <p:pRg st="5" end="5"/>
+                                            </p:txEl>
+                                          </p:spTgt>
+                                        </p:tgtEl>
+                                      </p:cBhvr>
+                                    </p:animEffect>
+                                  </p:childTnLst>
+                                </p:cTn>
+                              </p:par>
+                            </p:childTnLst>
+                          </p:cTn>
+                        </p:par>
+                      </p:childTnLst>
+                    </p:cTn>
+                  </p:par>
+                  <p:par>
+                    <p:cTn id="33" fill="hold">
+                      <p:stCondLst>
+                        <p:cond delay="indefinite"/>
+                      </p:stCondLst>
+                      <p:childTnLst>
+                        <p:par>
+                          <p:cTn id="34" fill="hold">
+                            <p:stCondLst>
+                              <p:cond delay="0"/>
+                            </p:stCondLst>
+                            <p:childTnLst>
+                              <p:par>
+                                <p:cTn id="35" presetID="10" presetClass="entr" presetSubtype="0" fill="hold" grpId="0" nodeType="clickEffect">
+                                  <p:stCondLst>
+                                    <p:cond delay="0"/>
+                                  </p:stCondLst>
+                                  <p:childTnLst>
+                                    <p:set>
+                                      <p:cBhvr>
+                                        <p:cTn id="36" dur="1" fill="hold">
+                                          <p:stCondLst>
+                                            <p:cond delay="0"/>
+                                          </p:stCondLst>
+                                        </p:cTn>
+                                        <p:tgtEl>
+                                          <p:spTgt spid="3">
+                                            <p:txEl>
+                                              <p:pRg st="6" end="6"/>
+                                            </p:txEl>
+                                          </p:spTgt>
+                                        </p:tgtEl>
+                                        <p:attrNameLst>
+                                          <p:attrName>style.visibility</p:attrName>
+                                        </p:attrNameLst>
+                                      </p:cBhvr>
+                                      <p:to>
+                                        <p:strVal val="visible"/>
+                                      </p:to>
+                                    </p:set>
+                                    <p:animEffect transition="in" filter="fade">
+                                      <p:cBhvr>
+                                        <p:cTn id="37" dur="500"/>
+                                        <p:tgtEl>
+                                          <p:spTgt spid="3">
+                                            <p:txEl>
+                                              <p:pRg st="6" end="6"/>
+                                            </p:txEl>
+                                          </p:spTgt>
+                                        </p:tgtEl>
+                                      </p:cBhvr>
+                                    </p:animEffect>
+                                  </p:childTnLst>
+                                </p:cTn>
+                              </p:par>
+                            </p:childTnLst>
+                          </p:cTn>
+                        </p:par>
+                      </p:childTnLst>
+                    </p:cTn>
+                  </p:par>
+                </p:childTnLst>
+              </p:cTn>
+              <p:prevCondLst>
+                <p:cond evt="onPrev" delay="0">
+                  <p:tgtEl>
+                    <p:sldTgt/>
+                  </p:tgtEl>
+                </p:cond>
+              </p:prevCondLst>
+              <p:nextCondLst>
+                <p:cond evt="onNext" delay="0">
+                  <p:tgtEl>
+                    <p:sldTgt/>
+                  </p:tgtEl>
+                </p:cond>
+              </p:nextCondLst>
+            </p:seq>
+          </p:childTnLst>
+        </p:cTn>
+      </p:par>
+    </p:tnLst>
+    <p:bldLst>
+      <p:bldP spid="3" grpId="0" build="p"/>
+    </p:bldLst>
+  </p:timing>
+</p:sld>
+</file>
+
+<file path=ppt/slides/slide7.xml><?xml version="1.0" encoding="utf-8"?>
+<p:sld xmlns:a="http://schemas.openxmlformats.org/drawingml/2006/main" xmlns:r="http://schemas.openxmlformats.org/officeDocument/2006/relationships" xmlns:p="http://schemas.openxmlformats.org/presentationml/2006/main">
+  <p:cSld>
+    <p:spTree>
+      <p:nvGrpSpPr>
+        <p:cNvPr id="1" name=""/>
+        <p:cNvGrpSpPr/>
+        <p:nvPr/>
+      </p:nvGrpSpPr>
+      <p:grpSpPr>
+        <a:xfrm>
+          <a:off x="0" y="0"/>
+          <a:ext cx="0" cy="0"/>
+          <a:chOff x="0" y="0"/>
+          <a:chExt cx="0" cy="0"/>
+        </a:xfrm>
+      </p:grpSpPr>
+      <p:sp>
+        <p:nvSpPr>
+          <p:cNvPr id="2" name="Title 1"/>
+          <p:cNvSpPr>
+            <a:spLocks noGrp="1"/>
+          </p:cNvSpPr>
+          <p:nvPr>
+            <p:ph type="title"/>
+          </p:nvPr>
+        </p:nvSpPr>
+        <p:spPr/>
+        <p:txBody>
+          <a:bodyPr/>
+          <a:lstStyle/>
+          <a:p>
+            <a:r>
+              <a:rPr lang="en-US" dirty="0" smtClean="0"/>
+              <a:t>A quick reality check</a:t>
+            </a:r>
+            <a:endParaRPr lang="en-US" dirty="0"/>
+          </a:p>
+        </p:txBody>
+      </p:sp>
+      <p:sp>
+        <p:nvSpPr>
+          <p:cNvPr id="3" name="Content Placeholder 2"/>
+          <p:cNvSpPr>
+            <a:spLocks noGrp="1"/>
+          </p:cNvSpPr>
+          <p:nvPr>
+            <p:ph idx="1"/>
+          </p:nvPr>
+        </p:nvSpPr>
+        <p:spPr/>
+        <p:txBody>
+          <a:bodyPr>
+            <a:normAutofit fontScale="85000" lnSpcReduction="10000"/>
+          </a:bodyPr>
+          <a:lstStyle/>
+          <a:p>
+            <a:r>
+              <a:rPr lang="en-US" sz="9600" dirty="0" smtClean="0"/>
+              <a:t>You are not Facebook or the Twitter</a:t>
+            </a:r>
+            <a:r>
+              <a:rPr lang="en-US" sz="9600" dirty="0" smtClean="0"/>
+              <a:t>.</a:t>
+            </a:r>
+          </a:p>
+          <a:p>
+            <a:r>
+              <a:rPr lang="en-US" sz="9600" dirty="0" smtClean="0"/>
+              <a:t>Don’t prematurely optimize.</a:t>
+            </a:r>
+            <a:endParaRPr lang="en-US" sz="9600" dirty="0"/>
+          </a:p>
+        </p:txBody>
+      </p:sp>
+    </p:spTree>
+    <p:extLst>
+      <p:ext uri="{BB962C8B-B14F-4D97-AF65-F5344CB8AC3E}">
+        <p14:creationId xmlns:p14="http://schemas.microsoft.com/office/powerpoint/2010/main" val="1194461399"/>
+      </p:ext>
+    </p:extLst>
+  </p:cSld>
+  <p:clrMapOvr>
+    <a:masterClrMapping/>
+  </p:clrMapOvr>
+  <p:timing>
+    <p:tnLst>
+      <p:par>
+        <p:cTn id="1" dur="indefinite" restart="never" nodeType="tmRoot"/>
+      </p:par>
+    </p:tnLst>
+  </p:timing>
+</p:sld>
+</file>
+
+<file path=ppt/slides/slide8.xml><?xml version="1.0" encoding="utf-8"?>
+<p:sld xmlns:a="http://schemas.openxmlformats.org/drawingml/2006/main" xmlns:r="http://schemas.openxmlformats.org/officeDocument/2006/relationships" xmlns:p="http://schemas.openxmlformats.org/presentationml/2006/main">
+  <p:cSld>
+    <p:spTree>
+      <p:nvGrpSpPr>
+        <p:cNvPr id="1" name=""/>
+        <p:cNvGrpSpPr/>
+        <p:nvPr/>
+      </p:nvGrpSpPr>
+      <p:grpSpPr>
+        <a:xfrm>
+          <a:off x="0" y="0"/>
+          <a:ext cx="0" cy="0"/>
+          <a:chOff x="0" y="0"/>
+          <a:chExt cx="0" cy="0"/>
+        </a:xfrm>
+      </p:grpSpPr>
+      <p:sp>
+        <p:nvSpPr>
+          <p:cNvPr id="2" name="Title 1"/>
+          <p:cNvSpPr>
+            <a:spLocks noGrp="1"/>
+          </p:cNvSpPr>
+          <p:nvPr>
+            <p:ph type="title"/>
+          </p:nvPr>
+        </p:nvSpPr>
+        <p:spPr/>
+        <p:txBody>
+          <a:bodyPr/>
+          <a:lstStyle/>
+          <a:p>
+            <a:r>
+              <a:rPr lang="en-US" dirty="0" smtClean="0"/>
+              <a:t>The new normal</a:t>
+            </a:r>
+            <a:endParaRPr lang="en-US" dirty="0"/>
+          </a:p>
+        </p:txBody>
+      </p:sp>
+      <p:sp>
+        <p:nvSpPr>
+          <p:cNvPr id="3" name="Content Placeholder 2"/>
+          <p:cNvSpPr>
+            <a:spLocks noGrp="1"/>
+          </p:cNvSpPr>
+          <p:nvPr>
+            <p:ph idx="1"/>
+          </p:nvPr>
+        </p:nvSpPr>
+        <p:spPr/>
+        <p:txBody>
+          <a:bodyPr>
+            <a:normAutofit fontScale="92500" lnSpcReduction="10000"/>
+          </a:bodyPr>
+          <a:lstStyle/>
+          <a:p>
+            <a:r>
+              <a:rPr lang="en-US" dirty="0" smtClean="0"/>
+              <a:t>Most SQL databases can do straight, single-key storage adequately.</a:t>
+            </a:r>
+          </a:p>
+          <a:p>
+            <a:r>
+              <a:rPr lang="en-US" dirty="0" smtClean="0"/>
+              <a:t>Fight the urge to normalize everything.</a:t>
+            </a:r>
+          </a:p>
+          <a:p>
+            <a:r>
+              <a:rPr lang="en-US" dirty="0" smtClean="0"/>
+              <a:t>Sometimes, it’s OK to compose instead of join (an important consideration for NoSQL usage, but also for SQL).</a:t>
+            </a:r>
+          </a:p>
+          <a:p>
+            <a:r>
+              <a:rPr lang="en-US" dirty="0" smtClean="0"/>
+              <a:t>Important: Don’t build schema around object graphs that never have to be interrogated. Just serialize it, drop it in a single field.</a:t>
+            </a:r>
+          </a:p>
+          <a:p>
+            <a:r>
+              <a:rPr lang="en-US" dirty="0" smtClean="0"/>
+              <a:t>Break down what your business need is, and figure out the fastest possible way to get it. Focus on the domain, not the persistence and code mechanisms</a:t>
+            </a:r>
+            <a:r>
+              <a:rPr lang="en-US" dirty="0" smtClean="0"/>
+              <a:t>.</a:t>
+            </a:r>
+          </a:p>
+          <a:p>
+            <a:r>
+              <a:rPr lang="en-US" dirty="0" smtClean="0"/>
+              <a:t>Hybrid solutions are (SQL + table/blob storage, SQL + key/value) are great options provided you can persist in a transactional manner.</a:t>
+            </a:r>
+            <a:endParaRPr lang="en-US" dirty="0"/>
+          </a:p>
+        </p:txBody>
+      </p:sp>
+    </p:spTree>
+    <p:extLst>
+      <p:ext uri="{BB962C8B-B14F-4D97-AF65-F5344CB8AC3E}">
+        <p14:creationId xmlns:p14="http://schemas.microsoft.com/office/powerpoint/2010/main" val="1753287024"/>
+      </p:ext>
+    </p:extLst>
+  </p:cSld>
+  <p:clrMapOvr>
+    <a:masterClrMapping/>
+  </p:clrMapOvr>
+  <p:timing>
+    <p:tnLst>
+      <p:par>
+        <p:cTn id="1" dur="indefinite" restart="never" nodeType="tmRoot">
+          <p:childTnLst>
+            <p:seq concurrent="1" nextAc="seek">
+              <p:cTn id="2" dur="indefinite" nodeType="mainSeq">
+                <p:childTnLst>
+                  <p:par>
+                    <p:cTn id="3" fill="hold">
+                      <p:stCondLst>
+                        <p:cond delay="indefinite"/>
+                      </p:stCondLst>
+                      <p:childTnLst>
+                        <p:par>
+                          <p:cTn id="4" fill="hold">
+                            <p:stCondLst>
+                              <p:cond delay="0"/>
+                            </p:stCondLst>
+                            <p:childTnLst>
+                              <p:par>
+                                <p:cTn id="5" presetID="10" presetClass="entr" presetSubtype="0" fill="hold" grpId="0" nodeType="clickEffect">
+                                  <p:stCondLst>
+                                    <p:cond delay="0"/>
+                                  </p:stCondLst>
+                                  <p:childTnLst>
+                                    <p:set>
+                                      <p:cBhvr>
+                                        <p:cTn id="6" dur="1" fill="hold">
+                                          <p:stCondLst>
+                                            <p:cond delay="0"/>
+                                          </p:stCondLst>
+                                        </p:cTn>
+                                        <p:tgtEl>
+                                          <p:spTgt spid="3">
+                                            <p:txEl>
+                                              <p:pRg st="0" end="0"/>
+                                            </p:txEl>
+                                          </p:spTgt>
+                                        </p:tgtEl>
+                                        <p:attrNameLst>
+                                          <p:attrName>style.visibility</p:attrName>
+                                        </p:attrNameLst>
+                                      </p:cBhvr>
+                                      <p:to>
+                                        <p:strVal val="visible"/>
+                                      </p:to>
+                                    </p:set>
+                                    <p:animEffect transition="in" filter="fade">
+                                      <p:cBhvr>
+                                        <p:cTn id="7" dur="500"/>
+                                        <p:tgtEl>
+                                          <p:spTgt spid="3">
+                                            <p:txEl>
+                                              <p:pRg st="0" end="0"/>
+                                            </p:txEl>
+                                          </p:spTgt>
+                                        </p:tgtEl>
+                                      </p:cBhvr>
+                                    </p:animEffect>
+                                  </p:childTnLst>
+                                </p:cTn>
+                              </p:par>
+                            </p:childTnLst>
+                          </p:cTn>
+                        </p:par>
+                      </p:childTnLst>
+                    </p:cTn>
+                  </p:par>
+                  <p:par>
+                    <p:cTn id="8" fill="hold">
+                      <p:stCondLst>
+                        <p:cond delay="indefinite"/>
+                      </p:stCondLst>
+                      <p:childTnLst>
+                        <p:par>
+                          <p:cTn id="9" fill="hold">
+                            <p:stCondLst>
+                              <p:cond delay="0"/>
+                            </p:stCondLst>
+                            <p:childTnLst>
+                              <p:par>
+                                <p:cTn id="10" presetID="10" presetClass="entr" presetSubtype="0" fill="hold" grpId="0" nodeType="clickEffect">
+                                  <p:stCondLst>
+                                    <p:cond delay="0"/>
+                                  </p:stCondLst>
+                                  <p:childTnLst>
+                                    <p:set>
+                                      <p:cBhvr>
+                                        <p:cTn id="11" dur="1" fill="hold">
+                                          <p:stCondLst>
+                                            <p:cond delay="0"/>
+                                          </p:stCondLst>
+                                        </p:cTn>
+                                        <p:tgtEl>
+                                          <p:spTgt spid="3">
+                                            <p:txEl>
+                                              <p:pRg st="1" end="1"/>
+                                            </p:txEl>
+                                          </p:spTgt>
+                                        </p:tgtEl>
+                                        <p:attrNameLst>
+                                          <p:attrName>style.visibility</p:attrName>
+                                        </p:attrNameLst>
+                                      </p:cBhvr>
+                                      <p:to>
+                                        <p:strVal val="visible"/>
+                                      </p:to>
+                                    </p:set>
+                                    <p:animEffect transition="in" filter="fade">
+                                      <p:cBhvr>
+                                        <p:cTn id="12" dur="500"/>
+                                        <p:tgtEl>
+                                          <p:spTgt spid="3">
+                                            <p:txEl>
+                                              <p:pRg st="1" end="1"/>
+                                            </p:txEl>
+                                          </p:spTgt>
+                                        </p:tgtEl>
+                                      </p:cBhvr>
+                                    </p:animEffect>
+                                  </p:childTnLst>
+                                </p:cTn>
+                              </p:par>
+                            </p:childTnLst>
+                          </p:cTn>
+                        </p:par>
+                      </p:childTnLst>
+                    </p:cTn>
+                  </p:par>
+                  <p:par>
+                    <p:cTn id="13" fill="hold">
+                      <p:stCondLst>
+                        <p:cond delay="indefinite"/>
+                      </p:stCondLst>
+                      <p:childTnLst>
+                        <p:par>
+                          <p:cTn id="14" fill="hold">
+                            <p:stCondLst>
+                              <p:cond delay="0"/>
+                            </p:stCondLst>
+                            <p:childTnLst>
+                              <p:par>
+                                <p:cTn id="15" presetID="10" presetClass="entr" presetSubtype="0" fill="hold" grpId="0" nodeType="clickEffect">
+                                  <p:stCondLst>
+                                    <p:cond delay="0"/>
+                                  </p:stCondLst>
+                                  <p:childTnLst>
+                                    <p:set>
+                                      <p:cBhvr>
+                                        <p:cTn id="16" dur="1" fill="hold">
+                                          <p:stCondLst>
+                                            <p:cond delay="0"/>
+                                          </p:stCondLst>
+                                        </p:cTn>
+                                        <p:tgtEl>
+                                          <p:spTgt spid="3">
+                                            <p:txEl>
+                                              <p:pRg st="2" end="2"/>
+                                            </p:txEl>
+                                          </p:spTgt>
+                                        </p:tgtEl>
+                                        <p:attrNameLst>
+                                          <p:attrName>style.visibility</p:attrName>
+                                        </p:attrNameLst>
+                                      </p:cBhvr>
+                                      <p:to>
+                                        <p:strVal val="visible"/>
+                                      </p:to>
+                                    </p:set>
+                                    <p:animEffect transition="in" filter="fade">
+                                      <p:cBhvr>
+                                        <p:cTn id="17" dur="500"/>
+                                        <p:tgtEl>
+                                          <p:spTgt spid="3">
+                                            <p:txEl>
+                                              <p:pRg st="2" end="2"/>
+                                            </p:txEl>
+                                          </p:spTgt>
+                                        </p:tgtEl>
+                                      </p:cBhvr>
+                                    </p:animEffect>
+                                  </p:childTnLst>
+                                </p:cTn>
+                              </p:par>
+                            </p:childTnLst>
+                          </p:cTn>
+                        </p:par>
+                      </p:childTnLst>
+                    </p:cTn>
+                  </p:par>
+                  <p:par>
+                    <p:cTn id="18" fill="hold">
+                      <p:stCondLst>
+                        <p:cond delay="indefinite"/>
+                      </p:stCondLst>
+                      <p:childTnLst>
+                        <p:par>
+                          <p:cTn id="19" fill="hold">
+                            <p:stCondLst>
+                              <p:cond delay="0"/>
+                            </p:stCondLst>
+                            <p:childTnLst>
+                              <p:par>
+                                <p:cTn id="20" presetID="10" presetClass="entr" presetSubtype="0" fill="hold" grpId="0" nodeType="clickEffect">
+                                  <p:stCondLst>
+                                    <p:cond delay="0"/>
+                                  </p:stCondLst>
+                                  <p:childTnLst>
+                                    <p:set>
+                                      <p:cBhvr>
+                                        <p:cTn id="21" dur="1" fill="hold">
+                                          <p:stCondLst>
+                                            <p:cond delay="0"/>
+                                          </p:stCondLst>
+                                        </p:cTn>
+                                        <p:tgtEl>
+                                          <p:spTgt spid="3">
+                                            <p:txEl>
+                                              <p:pRg st="3" end="3"/>
+                                            </p:txEl>
+                                          </p:spTgt>
+                                        </p:tgtEl>
+                                        <p:attrNameLst>
+                                          <p:attrName>style.visibility</p:attrName>
+                                        </p:attrNameLst>
+                                      </p:cBhvr>
+                                      <p:to>
+                                        <p:strVal val="visible"/>
+                                      </p:to>
+                                    </p:set>
+                                    <p:animEffect transition="in" filter="fade">
+                                      <p:cBhvr>
+                                        <p:cTn id="22" dur="500"/>
+                                        <p:tgtEl>
+                                          <p:spTgt spid="3">
+                                            <p:txEl>
+                                              <p:pRg st="3" end="3"/>
+                                            </p:txEl>
+                                          </p:spTgt>
+                                        </p:tgtEl>
+                                      </p:cBhvr>
+                                    </p:animEffect>
+                                  </p:childTnLst>
+                                </p:cTn>
+                              </p:par>
+                            </p:childTnLst>
+                          </p:cTn>
+                        </p:par>
+                      </p:childTnLst>
+                    </p:cTn>
+                  </p:par>
+                  <p:par>
+                    <p:cTn id="23" fill="hold">
+                      <p:stCondLst>
+                        <p:cond delay="indefinite"/>
+                      </p:stCondLst>
+                      <p:childTnLst>
+                        <p:par>
+                          <p:cTn id="24" fill="hold">
+                            <p:stCondLst>
+                              <p:cond delay="0"/>
+                            </p:stCondLst>
+                            <p:childTnLst>
+                              <p:par>
+                                <p:cTn id="25" presetID="10" presetClass="entr" presetSubtype="0" fill="hold" grpId="0" nodeType="clickEffect">
+                                  <p:stCondLst>
+                                    <p:cond delay="0"/>
+                                  </p:stCondLst>
+                                  <p:childTnLst>
+                                    <p:set>
+                                      <p:cBhvr>
+                                        <p:cTn id="26" dur="1" fill="hold">
+                                          <p:stCondLst>
+                                            <p:cond delay="0"/>
+                                          </p:stCondLst>
+                                        </p:cTn>
+                                        <p:tgtEl>
+                                          <p:spTgt spid="3">
+                                            <p:txEl>
+                                              <p:pRg st="4" end="4"/>
+                                            </p:txEl>
+                                          </p:spTgt>
+                                        </p:tgtEl>
+                                        <p:attrNameLst>
+                                          <p:attrName>style.visibility</p:attrName>
+                                        </p:attrNameLst>
+                                      </p:cBhvr>
+                                      <p:to>
+                                        <p:strVal val="visible"/>
+                                      </p:to>
+                                    </p:set>
+                                    <p:animEffect transition="in" filter="fade">
+                                      <p:cBhvr>
+                                        <p:cTn id="27" dur="500"/>
+                                        <p:tgtEl>
+                                          <p:spTgt spid="3">
+                                            <p:txEl>
+                                              <p:pRg st="4" end="4"/>
+                                            </p:txEl>
+                                          </p:spTgt>
+                                        </p:tgtEl>
+                                      </p:cBhvr>
+                                    </p:animEffect>
+                                  </p:childTnLst>
+                                </p:cTn>
+                              </p:par>
+                            </p:childTnLst>
+                          </p:cTn>
+                        </p:par>
+                      </p:childTnLst>
+                    </p:cTn>
+                  </p:par>
+                  <p:par>
+                    <p:cTn id="28" fill="hold">
+                      <p:stCondLst>
+                        <p:cond delay="indefinite"/>
+                      </p:stCondLst>
+                      <p:childTnLst>
+                        <p:par>
+                          <p:cTn id="29" fill="hold">
+                            <p:stCondLst>
+                              <p:cond delay="0"/>
+                            </p:stCondLst>
+                            <p:childTnLst>
+                              <p:par>
+                                <p:cTn id="30" presetID="10" presetClass="entr" presetSubtype="0" fill="hold" grpId="0" nodeType="clickEffect">
+                                  <p:stCondLst>
+                                    <p:cond delay="0"/>
+                                  </p:stCondLst>
+                                  <p:childTnLst>
+                                    <p:set>
+                                      <p:cBhvr>
+                                        <p:cTn id="31" dur="1" fill="hold">
+                                          <p:stCondLst>
+                                            <p:cond delay="0"/>
+                                          </p:stCondLst>
+                                        </p:cTn>
+                                        <p:tgtEl>
+                                          <p:spTgt spid="3">
+                                            <p:txEl>
+                                              <p:pRg st="5" end="5"/>
+                                            </p:txEl>
+                                          </p:spTgt>
+                                        </p:tgtEl>
+                                        <p:attrNameLst>
+                                          <p:attrName>style.visibility</p:attrName>
+                                        </p:attrNameLst>
+                                      </p:cBhvr>
+                                      <p:to>
+                                        <p:strVal val="visible"/>
+                                      </p:to>
+                                    </p:set>
+                                    <p:animEffect transition="in" filter="fade">
+                                      <p:cBhvr>
+                                        <p:cTn id="32" dur="500"/>
+                                        <p:tgtEl>
+                                          <p:spTgt spid="3">
+                                            <p:txEl>
+                                              <p:pRg st="5" end="5"/>
+                                            </p:txEl>
+                                          </p:spTgt>
+                                        </p:tgtEl>
+                                      </p:cBhvr>
+                                    </p:animEffect>
+                                  </p:childTnLst>
+                                </p:cTn>
+                              </p:par>
+                            </p:childTnLst>
+                          </p:cTn>
+                        </p:par>
+                      </p:childTnLst>
+                    </p:cTn>
+                  </p:par>
+                </p:childTnLst>
+              </p:cTn>
+              <p:prevCondLst>
+                <p:cond evt="onPrev" delay="0">
+                  <p:tgtEl>
+                    <p:sldTgt/>
+                  </p:tgtEl>
+                </p:cond>
+              </p:prevCondLst>
+              <p:nextCondLst>
+                <p:cond evt="onNext" delay="0">
+                  <p:tgtEl>
+                    <p:sldTgt/>
+                  </p:tgtEl>
+                </p:cond>
+              </p:nextCondLst>
+            </p:seq>
+          </p:childTnLst>
+        </p:cTn>
+      </p:par>
+    </p:tnLst>
+    <p:bldLst>
+      <p:bldP spid="3" grpId="0" build="p"/>
+    </p:bldLst>
+  </p:timing>
+</p:sld>
+</file>
+
+<file path=ppt/slides/slide9.xml><?xml version="1.0" encoding="utf-8"?>
+<p:sld xmlns:a="http://schemas.openxmlformats.org/drawingml/2006/main" xmlns:r="http://schemas.openxmlformats.org/officeDocument/2006/relationships" xmlns:p="http://schemas.openxmlformats.org/presentationml/2006/main">
+  <p:cSld>
+    <p:spTree>
+      <p:nvGrpSpPr>
+        <p:cNvPr id="1" name=""/>
+        <p:cNvGrpSpPr/>
+        <p:nvPr/>
+      </p:nvGrpSpPr>
+      <p:grpSpPr>
+        <a:xfrm>
+          <a:off x="0" y="0"/>
+          <a:ext cx="0" cy="0"/>
+          <a:chOff x="0" y="0"/>
+          <a:chExt cx="0" cy="0"/>
+        </a:xfrm>
+      </p:grpSpPr>
+      <p:sp>
+        <p:nvSpPr>
+          <p:cNvPr id="2" name="Title 1"/>
+          <p:cNvSpPr>
+            <a:spLocks noGrp="1"/>
+          </p:cNvSpPr>
+          <p:nvPr>
+            <p:ph type="title"/>
+          </p:nvPr>
+        </p:nvSpPr>
+        <p:spPr/>
+        <p:txBody>
+          <a:bodyPr/>
+          <a:lstStyle/>
+          <a:p>
+            <a:r>
+              <a:rPr lang="en-US" dirty="0" smtClean="0"/>
+              <a:t>“Normal” thinking</a:t>
+            </a:r>
+            <a:endParaRPr lang="en-US" dirty="0"/>
+          </a:p>
+        </p:txBody>
+      </p:sp>
+      <p:sp>
+        <p:nvSpPr>
+          <p:cNvPr id="3" name="Content Placeholder 2"/>
+          <p:cNvSpPr>
+            <a:spLocks noGrp="1"/>
+          </p:cNvSpPr>
+          <p:nvPr>
+            <p:ph idx="1"/>
+          </p:nvPr>
+        </p:nvSpPr>
+        <p:spPr/>
+        <p:txBody>
+          <a:bodyPr/>
+          <a:lstStyle/>
+          <a:p>
+            <a:r>
+              <a:rPr lang="en-US" dirty="0" smtClean="0"/>
+              <a:t>BAD:</a:t>
+            </a:r>
+          </a:p>
+          <a:p>
+            <a:pPr lvl="1"/>
+            <a:r>
+              <a:rPr lang="en-US" dirty="0" smtClean="0"/>
+              <a:t>Parent table with object definition and metadata</a:t>
+            </a:r>
+          </a:p>
+          <a:p>
+            <a:pPr lvl="1"/>
+            <a:r>
+              <a:rPr lang="en-US" dirty="0" smtClean="0"/>
+              <a:t>Child tables: Key value pairs</a:t>
+            </a:r>
+          </a:p>
+          <a:p>
+            <a:pPr lvl="1"/>
+            <a:r>
+              <a:rPr lang="en-US" dirty="0" smtClean="0"/>
+              <a:t>More tables: Actual data referencing the child tables</a:t>
+            </a:r>
+          </a:p>
+          <a:p>
+            <a:pPr lvl="1"/>
+            <a:endParaRPr lang="en-US" dirty="0"/>
+          </a:p>
+          <a:p>
+            <a:r>
+              <a:rPr lang="en-US" dirty="0" smtClean="0"/>
+              <a:t>GOOD:</a:t>
+            </a:r>
+          </a:p>
+          <a:p>
+            <a:pPr lvl="1"/>
+            <a:r>
+              <a:rPr lang="en-US" dirty="0" smtClean="0"/>
+              <a:t>One table, rows </a:t>
+            </a:r>
+            <a:r>
+              <a:rPr lang="en-US" dirty="0" smtClean="0"/>
+              <a:t>encapsulate the entity, </a:t>
+            </a:r>
+            <a:r>
+              <a:rPr lang="en-US" dirty="0" smtClean="0"/>
+              <a:t>metadata and serialized data blob</a:t>
+            </a:r>
+          </a:p>
+          <a:p>
+            <a:pPr lvl="1"/>
+            <a:endParaRPr lang="en-US" dirty="0"/>
+          </a:p>
+        </p:txBody>
+      </p:sp>
+    </p:spTree>
+    <p:extLst>
+      <p:ext uri="{BB962C8B-B14F-4D97-AF65-F5344CB8AC3E}">
+        <p14:creationId xmlns:p14="http://schemas.microsoft.com/office/powerpoint/2010/main" val="169488949"/>
+      </p:ext>
+    </p:extLst>
+  </p:cSld>
+  <p:clrMapOvr>
+    <a:masterClrMapping/>
+  </p:clrMapOvr>
+  <p:timing>
+    <p:tnLst>
+      <p:par>
+        <p:cTn id="1" dur="indefinite" restart="never" nodeType="tmRoot"/>
+      </p:par>
+    </p:tnLst>
+  </p:timing>
+</p:sld>
+</file>
+
 <file path=ppt/theme/theme1.xml><?xml version="1.0" encoding="utf-8"?>
 <a:theme xmlns:a="http://schemas.openxmlformats.org/drawingml/2006/main" name="Depth">
   <a:themeElements>

</xml_diff>